<commit_message>
chore:  - update slide presentation  - add 2 class in dart intro course
</commit_message>
<xml_diff>
--- a/doc/temario.pptx
+++ b/doc/temario.pptx
@@ -9,6 +9,7 @@
     <p:sldId id="257" r:id="rId3"/>
     <p:sldId id="258" r:id="rId4"/>
     <p:sldId id="259" r:id="rId5"/>
+    <p:sldId id="260" r:id="rId6"/>
   </p:sldIdLst>
   <p:sldSz cx="12192000" cy="6858000"/>
   <p:notesSz cx="6858000" cy="9144000"/>
@@ -6004,6 +6005,142 @@
 </p:sld>
 </file>
 
+<file path=ppt/slides/slide5.xml><?xml version="1.0" encoding="utf-8"?>
+<p:sld xmlns:a="http://schemas.openxmlformats.org/drawingml/2006/main" xmlns:r="http://schemas.openxmlformats.org/officeDocument/2006/relationships" xmlns:p="http://schemas.openxmlformats.org/presentationml/2006/main">
+  <p:cSld>
+    <p:spTree>
+      <p:nvGrpSpPr>
+        <p:cNvPr id="1" name=""/>
+        <p:cNvGrpSpPr/>
+        <p:nvPr/>
+      </p:nvGrpSpPr>
+      <p:grpSpPr>
+        <a:xfrm>
+          <a:off x="0" y="0"/>
+          <a:ext cx="0" cy="0"/>
+          <a:chOff x="0" y="0"/>
+          <a:chExt cx="0" cy="0"/>
+        </a:xfrm>
+      </p:grpSpPr>
+      <p:sp>
+        <p:nvSpPr>
+          <p:cNvPr id="4" name="TextBox 3">
+            <a:hlinkClick r:id="rId2"/>
+            <a:extLst>
+              <a:ext uri="{FF2B5EF4-FFF2-40B4-BE49-F238E27FC236}">
+                <a16:creationId xmlns:a16="http://schemas.microsoft.com/office/drawing/2014/main" id="{70E0FBBD-5063-4193-B4D3-C42F2A50788B}"/>
+              </a:ext>
+            </a:extLst>
+          </p:cNvPr>
+          <p:cNvSpPr txBox="1"/>
+          <p:nvPr/>
+        </p:nvSpPr>
+        <p:spPr>
+          <a:xfrm>
+            <a:off x="257452" y="363971"/>
+            <a:ext cx="2965042" cy="461665"/>
+          </a:xfrm>
+          <a:prstGeom prst="rect">
+            <a:avLst/>
+          </a:prstGeom>
+          <a:noFill/>
+        </p:spPr>
+        <p:txBody>
+          <a:bodyPr wrap="none" rtlCol="0">
+            <a:spAutoFit/>
+          </a:bodyPr>
+          <a:lstStyle/>
+          <a:p>
+            <a:r>
+              <a:rPr lang="es-US" sz="2400" dirty="0"/>
+              <a:t>Instalar</a:t>
+            </a:r>
+            <a:r>
+              <a:rPr lang="en-US" sz="2400" dirty="0"/>
+              <a:t> el SDK de Dart</a:t>
+            </a:r>
+          </a:p>
+        </p:txBody>
+      </p:sp>
+      <mc:AlternateContent xmlns:mc="http://schemas.openxmlformats.org/markup-compatibility/2006">
+        <mc:Choice xmlns:we="http://schemas.microsoft.com/office/webextensions/webextension/2010/11" xmlns:pca="http://schemas.microsoft.com/office/powerpoint/2013/contentapp" Requires="we pca">
+          <p:graphicFrame>
+            <p:nvGraphicFramePr>
+              <p:cNvPr id="7" name="Add-in 6" title="Web Viewer">
+                <a:extLst>
+                  <a:ext uri="{FF2B5EF4-FFF2-40B4-BE49-F238E27FC236}">
+                    <a16:creationId xmlns:a16="http://schemas.microsoft.com/office/drawing/2014/main" id="{FC5E94E3-D7A4-42D6-8300-1F969A392F1A}"/>
+                  </a:ext>
+                </a:extLst>
+              </p:cNvPr>
+              <p:cNvGraphicFramePr>
+                <a:graphicFrameLocks noGrp="1"/>
+              </p:cNvGraphicFramePr>
+              <p:nvPr>
+                <p:extLst>
+                  <p:ext uri="{D42A27DB-BD31-4B8C-83A1-F6EECF244321}">
+                    <p14:modId xmlns:p14="http://schemas.microsoft.com/office/powerpoint/2010/main" val="2335154262"/>
+                  </p:ext>
+                </p:extLst>
+              </p:nvPr>
+            </p:nvGraphicFramePr>
+            <p:xfrm>
+              <a:off x="257452" y="825637"/>
+              <a:ext cx="11629748" cy="5566286"/>
+            </p:xfrm>
+            <a:graphic>
+              <a:graphicData uri="http://schemas.microsoft.com/office/webextensions/webextension/2010/11">
+                <we:webextensionref xmlns:we="http://schemas.microsoft.com/office/webextensions/webextension/2010/11" xmlns:r="http://schemas.openxmlformats.org/officeDocument/2006/relationships" r:id="rId3"/>
+              </a:graphicData>
+            </a:graphic>
+          </p:graphicFrame>
+        </mc:Choice>
+        <mc:Fallback>
+          <p:pic>
+            <p:nvPicPr>
+              <p:cNvPr id="7" name="Add-in 6" title="Web Viewer">
+                <a:extLst>
+                  <a:ext uri="{FF2B5EF4-FFF2-40B4-BE49-F238E27FC236}">
+                    <a16:creationId xmlns:a16="http://schemas.microsoft.com/office/drawing/2014/main" id="{FC5E94E3-D7A4-42D6-8300-1F969A392F1A}"/>
+                  </a:ext>
+                </a:extLst>
+              </p:cNvPr>
+              <p:cNvPicPr>
+                <a:picLocks noGrp="1" noRot="1" noChangeAspect="1" noMove="1" noResize="1" noEditPoints="1" noAdjustHandles="1" noChangeArrowheads="1" noChangeShapeType="1"/>
+              </p:cNvPicPr>
+              <p:nvPr/>
+            </p:nvPicPr>
+            <p:blipFill>
+              <a:blip r:embed="rId4"/>
+              <a:stretch>
+                <a:fillRect/>
+              </a:stretch>
+            </p:blipFill>
+            <p:spPr>
+              <a:xfrm>
+                <a:off x="257452" y="825637"/>
+                <a:ext cx="11629748" cy="5566286"/>
+              </a:xfrm>
+              <a:prstGeom prst="rect">
+                <a:avLst/>
+              </a:prstGeom>
+            </p:spPr>
+          </p:pic>
+        </mc:Fallback>
+      </mc:AlternateContent>
+    </p:spTree>
+    <p:extLst>
+      <p:ext uri="{BB962C8B-B14F-4D97-AF65-F5344CB8AC3E}">
+        <p14:creationId xmlns:p14="http://schemas.microsoft.com/office/powerpoint/2010/main" val="4016578206"/>
+      </p:ext>
+    </p:extLst>
+  </p:cSld>
+  <p:clrMapOvr>
+    <a:masterClrMapping/>
+  </p:clrMapOvr>
+</p:sld>
+</file>
+
 <file path=ppt/theme/theme1.xml><?xml version="1.0" encoding="utf-8"?>
 <a:theme xmlns:a="http://schemas.openxmlformats.org/drawingml/2006/main" name="Office Theme">
   <a:themeElements>
@@ -6297,4 +6434,18 @@
     </a:ext>
   </a:extLst>
 </a:theme>
+</file>
+
+<file path=ppt/webextensions/webextension1.xml><?xml version="1.0" encoding="utf-8"?>
+<we:webextension xmlns:we="http://schemas.microsoft.com/office/webextensions/webextension/2010/11" id="{CC767925-2FCB-4503-84A7-9A2D8CE2BC35}">
+  <we:reference id="wa104295828" version="1.6.0.0" store="en-US" storeType="OMEX"/>
+  <we:alternateReferences>
+    <we:reference id="WA104295828" version="1.6.0.0" store="WA104295828" storeType="OMEX"/>
+  </we:alternateReferences>
+  <we:properties>
+    <we:property name="__labs__" value="{&quot;configuration&quot;:{&quot;appVersion&quot;:{&quot;major&quot;:1,&quot;minor&quot;:0},&quot;components&quot;:[{&quot;type&quot;:&quot;Labs.Components.ActivityComponent&quot;,&quot;name&quot;:&quot;dartpad.dartlang.org/&quot;,&quot;values&quot;:{},&quot;data&quot;:{&quot;uri&quot;:&quot;dartpad.dartlang.org/&quot;},&quot;secure&quot;:false}],&quot;name&quot;:&quot;dartpad.dartlang.org/&quot;,&quot;timeline&quot;:null,&quot;analytics&quot;:null},&quot;hostVersion&quot;:{&quot;major&quot;:0,&quot;minor&quot;:1}}"/>
+  </we:properties>
+  <we:bindings/>
+  <we:snapshot xmlns:r="http://schemas.openxmlformats.org/officeDocument/2006/relationships" r:embed="rId1"/>
+</we:webextension>
 </file>
</xml_diff>

<commit_message>
chore: add conditionals and switch option
</commit_message>
<xml_diff>
--- a/doc/temario.pptx
+++ b/doc/temario.pptx
@@ -10,6 +10,7 @@
     <p:sldId id="258" r:id="rId4"/>
     <p:sldId id="259" r:id="rId5"/>
     <p:sldId id="260" r:id="rId6"/>
+    <p:sldId id="261" r:id="rId7"/>
   </p:sldIdLst>
   <p:sldSz cx="12192000" cy="6858000"/>
   <p:notesSz cx="6858000" cy="9144000"/>
@@ -263,7 +264,7 @@
           <a:p>
             <a:fld id="{BDB340C8-6E77-45F4-B009-4185183E7707}" type="datetimeFigureOut">
               <a:rPr lang="en-US" smtClean="0"/>
-              <a:t>4/21/2019</a:t>
+              <a:t>4/29/2019</a:t>
             </a:fld>
             <a:endParaRPr lang="en-US"/>
           </a:p>
@@ -461,7 +462,7 @@
           <a:p>
             <a:fld id="{BDB340C8-6E77-45F4-B009-4185183E7707}" type="datetimeFigureOut">
               <a:rPr lang="en-US" smtClean="0"/>
-              <a:t>4/21/2019</a:t>
+              <a:t>4/29/2019</a:t>
             </a:fld>
             <a:endParaRPr lang="en-US"/>
           </a:p>
@@ -669,7 +670,7 @@
           <a:p>
             <a:fld id="{BDB340C8-6E77-45F4-B009-4185183E7707}" type="datetimeFigureOut">
               <a:rPr lang="en-US" smtClean="0"/>
-              <a:t>4/21/2019</a:t>
+              <a:t>4/29/2019</a:t>
             </a:fld>
             <a:endParaRPr lang="en-US"/>
           </a:p>
@@ -867,7 +868,7 @@
           <a:p>
             <a:fld id="{BDB340C8-6E77-45F4-B009-4185183E7707}" type="datetimeFigureOut">
               <a:rPr lang="en-US" smtClean="0"/>
-              <a:t>4/21/2019</a:t>
+              <a:t>4/29/2019</a:t>
             </a:fld>
             <a:endParaRPr lang="en-US"/>
           </a:p>
@@ -1142,7 +1143,7 @@
           <a:p>
             <a:fld id="{BDB340C8-6E77-45F4-B009-4185183E7707}" type="datetimeFigureOut">
               <a:rPr lang="en-US" smtClean="0"/>
-              <a:t>4/21/2019</a:t>
+              <a:t>4/29/2019</a:t>
             </a:fld>
             <a:endParaRPr lang="en-US"/>
           </a:p>
@@ -1407,7 +1408,7 @@
           <a:p>
             <a:fld id="{BDB340C8-6E77-45F4-B009-4185183E7707}" type="datetimeFigureOut">
               <a:rPr lang="en-US" smtClean="0"/>
-              <a:t>4/21/2019</a:t>
+              <a:t>4/29/2019</a:t>
             </a:fld>
             <a:endParaRPr lang="en-US"/>
           </a:p>
@@ -1819,7 +1820,7 @@
           <a:p>
             <a:fld id="{BDB340C8-6E77-45F4-B009-4185183E7707}" type="datetimeFigureOut">
               <a:rPr lang="en-US" smtClean="0"/>
-              <a:t>4/21/2019</a:t>
+              <a:t>4/29/2019</a:t>
             </a:fld>
             <a:endParaRPr lang="en-US"/>
           </a:p>
@@ -1960,7 +1961,7 @@
           <a:p>
             <a:fld id="{BDB340C8-6E77-45F4-B009-4185183E7707}" type="datetimeFigureOut">
               <a:rPr lang="en-US" smtClean="0"/>
-              <a:t>4/21/2019</a:t>
+              <a:t>4/29/2019</a:t>
             </a:fld>
             <a:endParaRPr lang="en-US"/>
           </a:p>
@@ -2073,7 +2074,7 @@
           <a:p>
             <a:fld id="{BDB340C8-6E77-45F4-B009-4185183E7707}" type="datetimeFigureOut">
               <a:rPr lang="en-US" smtClean="0"/>
-              <a:t>4/21/2019</a:t>
+              <a:t>4/29/2019</a:t>
             </a:fld>
             <a:endParaRPr lang="en-US"/>
           </a:p>
@@ -2384,7 +2385,7 @@
           <a:p>
             <a:fld id="{BDB340C8-6E77-45F4-B009-4185183E7707}" type="datetimeFigureOut">
               <a:rPr lang="en-US" smtClean="0"/>
-              <a:t>4/21/2019</a:t>
+              <a:t>4/29/2019</a:t>
             </a:fld>
             <a:endParaRPr lang="en-US"/>
           </a:p>
@@ -2672,7 +2673,7 @@
           <a:p>
             <a:fld id="{BDB340C8-6E77-45F4-B009-4185183E7707}" type="datetimeFigureOut">
               <a:rPr lang="en-US" smtClean="0"/>
-              <a:t>4/21/2019</a:t>
+              <a:t>4/29/2019</a:t>
             </a:fld>
             <a:endParaRPr lang="en-US"/>
           </a:p>
@@ -2913,7 +2914,7 @@
           <a:p>
             <a:fld id="{BDB340C8-6E77-45F4-B009-4185183E7707}" type="datetimeFigureOut">
               <a:rPr lang="en-US" smtClean="0"/>
-              <a:t>4/21/2019</a:t>
+              <a:t>4/29/2019</a:t>
             </a:fld>
             <a:endParaRPr lang="en-US"/>
           </a:p>
@@ -6062,8 +6063,8 @@
           </a:p>
         </p:txBody>
       </p:sp>
-      <mc:AlternateContent xmlns:mc="http://schemas.openxmlformats.org/markup-compatibility/2006">
-        <mc:Choice xmlns:we="http://schemas.microsoft.com/office/webextensions/webextension/2010/11" xmlns:pca="http://schemas.microsoft.com/office/powerpoint/2013/contentapp" Requires="we pca">
+      <mc:AlternateContent xmlns:mc="http://schemas.openxmlformats.org/markup-compatibility/2006" xmlns:we="http://schemas.microsoft.com/office/webextensions/webextension/2010/11" xmlns:pca="http://schemas.microsoft.com/office/powerpoint/2013/contentapp">
+        <mc:Choice Requires="we pca">
           <p:graphicFrame>
             <p:nvGraphicFramePr>
               <p:cNvPr id="7" name="Add-in 6" title="Web Viewer">
@@ -6095,7 +6096,7 @@
             </a:graphic>
           </p:graphicFrame>
         </mc:Choice>
-        <mc:Fallback>
+        <mc:Fallback xmlns="">
           <p:pic>
             <p:nvPicPr>
               <p:cNvPr id="7" name="Add-in 6" title="Web Viewer">
@@ -6132,6 +6133,236 @@
     <p:extLst>
       <p:ext uri="{BB962C8B-B14F-4D97-AF65-F5344CB8AC3E}">
         <p14:creationId xmlns:p14="http://schemas.microsoft.com/office/powerpoint/2010/main" val="4016578206"/>
+      </p:ext>
+    </p:extLst>
+  </p:cSld>
+  <p:clrMapOvr>
+    <a:masterClrMapping/>
+  </p:clrMapOvr>
+</p:sld>
+</file>
+
+<file path=ppt/slides/slide6.xml><?xml version="1.0" encoding="utf-8"?>
+<p:sld xmlns:a="http://schemas.openxmlformats.org/drawingml/2006/main" xmlns:r="http://schemas.openxmlformats.org/officeDocument/2006/relationships" xmlns:p="http://schemas.openxmlformats.org/presentationml/2006/main">
+  <p:cSld>
+    <p:spTree>
+      <p:nvGrpSpPr>
+        <p:cNvPr id="1" name=""/>
+        <p:cNvGrpSpPr/>
+        <p:nvPr/>
+      </p:nvGrpSpPr>
+      <p:grpSpPr>
+        <a:xfrm>
+          <a:off x="0" y="0"/>
+          <a:ext cx="0" cy="0"/>
+          <a:chOff x="0" y="0"/>
+          <a:chExt cx="0" cy="0"/>
+        </a:xfrm>
+      </p:grpSpPr>
+      <p:sp>
+        <p:nvSpPr>
+          <p:cNvPr id="4" name="TextBox 3">
+            <a:extLst>
+              <a:ext uri="{FF2B5EF4-FFF2-40B4-BE49-F238E27FC236}">
+                <a16:creationId xmlns:a16="http://schemas.microsoft.com/office/drawing/2014/main" id="{1CC45E73-CA89-4CD1-9E99-2A8279D85A82}"/>
+              </a:ext>
+            </a:extLst>
+          </p:cNvPr>
+          <p:cNvSpPr txBox="1"/>
+          <p:nvPr/>
+        </p:nvSpPr>
+        <p:spPr>
+          <a:xfrm>
+            <a:off x="363984" y="284086"/>
+            <a:ext cx="2742610" cy="523220"/>
+          </a:xfrm>
+          <a:prstGeom prst="rect">
+            <a:avLst/>
+          </a:prstGeom>
+          <a:noFill/>
+        </p:spPr>
+        <p:txBody>
+          <a:bodyPr wrap="none" rtlCol="0">
+            <a:spAutoFit/>
+          </a:bodyPr>
+          <a:lstStyle/>
+          <a:p>
+            <a:r>
+              <a:rPr lang="en-US" sz="2800" dirty="0"/>
+              <a:t>1. </a:t>
+            </a:r>
+            <a:r>
+              <a:rPr lang="en-US" sz="2800" dirty="0" err="1"/>
+              <a:t>Tipos</a:t>
+            </a:r>
+            <a:r>
+              <a:rPr lang="en-US" sz="2800" dirty="0"/>
+              <a:t> de </a:t>
+            </a:r>
+            <a:r>
+              <a:rPr lang="en-US" sz="2800" dirty="0" err="1"/>
+              <a:t>datos</a:t>
+            </a:r>
+            <a:r>
+              <a:rPr lang="en-US" sz="2800" dirty="0"/>
+              <a:t>.</a:t>
+            </a:r>
+          </a:p>
+        </p:txBody>
+      </p:sp>
+      <p:sp>
+        <p:nvSpPr>
+          <p:cNvPr id="5" name="TextBox 4">
+            <a:extLst>
+              <a:ext uri="{FF2B5EF4-FFF2-40B4-BE49-F238E27FC236}">
+                <a16:creationId xmlns:a16="http://schemas.microsoft.com/office/drawing/2014/main" id="{E99304F1-E906-4529-B47C-69A988392A2F}"/>
+              </a:ext>
+            </a:extLst>
+          </p:cNvPr>
+          <p:cNvSpPr txBox="1"/>
+          <p:nvPr/>
+        </p:nvSpPr>
+        <p:spPr>
+          <a:xfrm>
+            <a:off x="363984" y="2905780"/>
+            <a:ext cx="2656496" cy="523220"/>
+          </a:xfrm>
+          <a:prstGeom prst="rect">
+            <a:avLst/>
+          </a:prstGeom>
+          <a:noFill/>
+        </p:spPr>
+        <p:txBody>
+          <a:bodyPr wrap="none" rtlCol="0">
+            <a:spAutoFit/>
+          </a:bodyPr>
+          <a:lstStyle/>
+          <a:p>
+            <a:r>
+              <a:rPr lang="en-US" sz="2800" dirty="0"/>
+              <a:t>2. </a:t>
+            </a:r>
+            <a:r>
+              <a:rPr lang="en-US" sz="2800" dirty="0" err="1"/>
+              <a:t>Condicionales</a:t>
+            </a:r>
+            <a:r>
+              <a:rPr lang="en-US" sz="2800" dirty="0"/>
+              <a:t>.</a:t>
+            </a:r>
+          </a:p>
+        </p:txBody>
+      </p:sp>
+      <p:sp>
+        <p:nvSpPr>
+          <p:cNvPr id="6" name="TextBox 5">
+            <a:extLst>
+              <a:ext uri="{FF2B5EF4-FFF2-40B4-BE49-F238E27FC236}">
+                <a16:creationId xmlns:a16="http://schemas.microsoft.com/office/drawing/2014/main" id="{5947E267-2E30-4651-B6BE-D01B99F33AEC}"/>
+              </a:ext>
+            </a:extLst>
+          </p:cNvPr>
+          <p:cNvSpPr txBox="1"/>
+          <p:nvPr/>
+        </p:nvSpPr>
+        <p:spPr>
+          <a:xfrm>
+            <a:off x="702815" y="870010"/>
+            <a:ext cx="10786369" cy="1754326"/>
+          </a:xfrm>
+          <a:prstGeom prst="rect">
+            <a:avLst/>
+          </a:prstGeom>
+          <a:noFill/>
+        </p:spPr>
+        <p:txBody>
+          <a:bodyPr wrap="square" rtlCol="0">
+            <a:spAutoFit/>
+          </a:bodyPr>
+          <a:lstStyle/>
+          <a:p>
+            <a:r>
+              <a:rPr lang="en-US" dirty="0"/>
+              <a:t>Numbers.</a:t>
+            </a:r>
+          </a:p>
+          <a:p>
+            <a:r>
+              <a:rPr lang="en-US" dirty="0"/>
+              <a:t>Strings.</a:t>
+            </a:r>
+          </a:p>
+          <a:p>
+            <a:r>
+              <a:rPr lang="en-US" dirty="0"/>
+              <a:t>Booleans.</a:t>
+            </a:r>
+          </a:p>
+          <a:p>
+            <a:r>
+              <a:rPr lang="en-US" dirty="0"/>
+              <a:t>Sets.</a:t>
+            </a:r>
+          </a:p>
+          <a:p>
+            <a:r>
+              <a:rPr lang="en-US" dirty="0"/>
+              <a:t>Arrays.</a:t>
+            </a:r>
+          </a:p>
+          <a:p>
+            <a:r>
+              <a:rPr lang="en-US" dirty="0"/>
+              <a:t>Maps.</a:t>
+            </a:r>
+          </a:p>
+        </p:txBody>
+      </p:sp>
+      <p:sp>
+        <p:nvSpPr>
+          <p:cNvPr id="7" name="TextBox 6">
+            <a:extLst>
+              <a:ext uri="{FF2B5EF4-FFF2-40B4-BE49-F238E27FC236}">
+                <a16:creationId xmlns:a16="http://schemas.microsoft.com/office/drawing/2014/main" id="{165801C7-E6E9-4D0F-8CF6-124A130FE46E}"/>
+              </a:ext>
+            </a:extLst>
+          </p:cNvPr>
+          <p:cNvSpPr txBox="1"/>
+          <p:nvPr/>
+        </p:nvSpPr>
+        <p:spPr>
+          <a:xfrm>
+            <a:off x="702814" y="3429000"/>
+            <a:ext cx="10786369" cy="646331"/>
+          </a:xfrm>
+          <a:prstGeom prst="rect">
+            <a:avLst/>
+          </a:prstGeom>
+          <a:noFill/>
+        </p:spPr>
+        <p:txBody>
+          <a:bodyPr wrap="square" rtlCol="0">
+            <a:spAutoFit/>
+          </a:bodyPr>
+          <a:lstStyle/>
+          <a:p>
+            <a:r>
+              <a:rPr lang="en-US" dirty="0"/>
+              <a:t>IF and ELSE</a:t>
+            </a:r>
+          </a:p>
+          <a:p>
+            <a:r>
+              <a:rPr lang="en-US" dirty="0"/>
+              <a:t>SWITCH and Case</a:t>
+            </a:r>
+          </a:p>
+        </p:txBody>
+      </p:sp>
+    </p:spTree>
+    <p:extLst>
+      <p:ext uri="{BB962C8B-B14F-4D97-AF65-F5344CB8AC3E}">
+        <p14:creationId xmlns:p14="http://schemas.microsoft.com/office/powerpoint/2010/main" val="2956183196"/>
       </p:ext>
     </p:extLst>
   </p:cSld>

</xml_diff>

<commit_message>
chore: add flutter folder
</commit_message>
<xml_diff>
--- a/doc/temario.pptx
+++ b/doc/temario.pptx
@@ -4,6 +4,9 @@
   <p:sldMasterIdLst>
     <p:sldMasterId id="2147483712" r:id="rId1"/>
   </p:sldMasterIdLst>
+  <p:notesMasterIdLst>
+    <p:notesMasterId r:id="rId10"/>
+  </p:notesMasterIdLst>
   <p:sldIdLst>
     <p:sldId id="256" r:id="rId2"/>
     <p:sldId id="257" r:id="rId3"/>
@@ -11,6 +14,8 @@
     <p:sldId id="259" r:id="rId5"/>
     <p:sldId id="260" r:id="rId6"/>
     <p:sldId id="261" r:id="rId7"/>
+    <p:sldId id="262" r:id="rId8"/>
+    <p:sldId id="263" r:id="rId9"/>
   </p:sldIdLst>
   <p:sldSz cx="12192000" cy="6858000"/>
   <p:notesSz cx="6858000" cy="9144000"/>
@@ -117,6 +122,1401 @@
 </p:presentation>
 </file>
 
+<file path=ppt/notesMasters/notesMaster1.xml><?xml version="1.0" encoding="utf-8"?>
+<p:notesMaster xmlns:a="http://schemas.openxmlformats.org/drawingml/2006/main" xmlns:r="http://schemas.openxmlformats.org/officeDocument/2006/relationships" xmlns:p="http://schemas.openxmlformats.org/presentationml/2006/main">
+  <p:cSld>
+    <p:bg>
+      <p:bgRef idx="1001">
+        <a:schemeClr val="bg1"/>
+      </p:bgRef>
+    </p:bg>
+    <p:spTree>
+      <p:nvGrpSpPr>
+        <p:cNvPr id="1" name=""/>
+        <p:cNvGrpSpPr/>
+        <p:nvPr/>
+      </p:nvGrpSpPr>
+      <p:grpSpPr>
+        <a:xfrm>
+          <a:off x="0" y="0"/>
+          <a:ext cx="0" cy="0"/>
+          <a:chOff x="0" y="0"/>
+          <a:chExt cx="0" cy="0"/>
+        </a:xfrm>
+      </p:grpSpPr>
+      <p:sp>
+        <p:nvSpPr>
+          <p:cNvPr id="2" name="Header Placeholder 1"/>
+          <p:cNvSpPr>
+            <a:spLocks noGrp="1"/>
+          </p:cNvSpPr>
+          <p:nvPr>
+            <p:ph type="hdr" sz="quarter"/>
+          </p:nvPr>
+        </p:nvSpPr>
+        <p:spPr>
+          <a:xfrm>
+            <a:off x="0" y="0"/>
+            <a:ext cx="2971800" cy="458788"/>
+          </a:xfrm>
+          <a:prstGeom prst="rect">
+            <a:avLst/>
+          </a:prstGeom>
+        </p:spPr>
+        <p:txBody>
+          <a:bodyPr vert="horz" lIns="91440" tIns="45720" rIns="91440" bIns="45720" rtlCol="0"/>
+          <a:lstStyle>
+            <a:lvl1pPr algn="l">
+              <a:defRPr sz="1200"/>
+            </a:lvl1pPr>
+          </a:lstStyle>
+          <a:p>
+            <a:endParaRPr lang="en-US"/>
+          </a:p>
+        </p:txBody>
+      </p:sp>
+      <p:sp>
+        <p:nvSpPr>
+          <p:cNvPr id="3" name="Date Placeholder 2"/>
+          <p:cNvSpPr>
+            <a:spLocks noGrp="1"/>
+          </p:cNvSpPr>
+          <p:nvPr>
+            <p:ph type="dt" idx="1"/>
+          </p:nvPr>
+        </p:nvSpPr>
+        <p:spPr>
+          <a:xfrm>
+            <a:off x="3884613" y="0"/>
+            <a:ext cx="2971800" cy="458788"/>
+          </a:xfrm>
+          <a:prstGeom prst="rect">
+            <a:avLst/>
+          </a:prstGeom>
+        </p:spPr>
+        <p:txBody>
+          <a:bodyPr vert="horz" lIns="91440" tIns="45720" rIns="91440" bIns="45720" rtlCol="0"/>
+          <a:lstStyle>
+            <a:lvl1pPr algn="r">
+              <a:defRPr sz="1200"/>
+            </a:lvl1pPr>
+          </a:lstStyle>
+          <a:p>
+            <a:fld id="{2AFBF1CE-A3A7-40A9-A610-8E5FEE4BAB97}" type="datetimeFigureOut">
+              <a:rPr lang="en-US" smtClean="0"/>
+              <a:t>5/27/2019</a:t>
+            </a:fld>
+            <a:endParaRPr lang="en-US"/>
+          </a:p>
+        </p:txBody>
+      </p:sp>
+      <p:sp>
+        <p:nvSpPr>
+          <p:cNvPr id="4" name="Slide Image Placeholder 3"/>
+          <p:cNvSpPr>
+            <a:spLocks noGrp="1" noRot="1" noChangeAspect="1"/>
+          </p:cNvSpPr>
+          <p:nvPr>
+            <p:ph type="sldImg" idx="2"/>
+          </p:nvPr>
+        </p:nvSpPr>
+        <p:spPr>
+          <a:xfrm>
+            <a:off x="685800" y="1143000"/>
+            <a:ext cx="5486400" cy="3086100"/>
+          </a:xfrm>
+          <a:prstGeom prst="rect">
+            <a:avLst/>
+          </a:prstGeom>
+          <a:noFill/>
+          <a:ln w="12700">
+            <a:solidFill>
+              <a:prstClr val="black"/>
+            </a:solidFill>
+          </a:ln>
+        </p:spPr>
+        <p:txBody>
+          <a:bodyPr vert="horz" lIns="91440" tIns="45720" rIns="91440" bIns="45720" rtlCol="0" anchor="ctr"/>
+          <a:lstStyle/>
+          <a:p>
+            <a:endParaRPr lang="en-US"/>
+          </a:p>
+        </p:txBody>
+      </p:sp>
+      <p:sp>
+        <p:nvSpPr>
+          <p:cNvPr id="5" name="Notes Placeholder 4"/>
+          <p:cNvSpPr>
+            <a:spLocks noGrp="1"/>
+          </p:cNvSpPr>
+          <p:nvPr>
+            <p:ph type="body" sz="quarter" idx="3"/>
+          </p:nvPr>
+        </p:nvSpPr>
+        <p:spPr>
+          <a:xfrm>
+            <a:off x="685800" y="4400550"/>
+            <a:ext cx="5486400" cy="3600450"/>
+          </a:xfrm>
+          <a:prstGeom prst="rect">
+            <a:avLst/>
+          </a:prstGeom>
+        </p:spPr>
+        <p:txBody>
+          <a:bodyPr vert="horz" lIns="91440" tIns="45720" rIns="91440" bIns="45720" rtlCol="0"/>
+          <a:lstStyle/>
+          <a:p>
+            <a:pPr lvl="0"/>
+            <a:r>
+              <a:rPr lang="en-US"/>
+              <a:t>Click to edit Master text styles</a:t>
+            </a:r>
+          </a:p>
+          <a:p>
+            <a:pPr lvl="1"/>
+            <a:r>
+              <a:rPr lang="en-US"/>
+              <a:t>Second level</a:t>
+            </a:r>
+          </a:p>
+          <a:p>
+            <a:pPr lvl="2"/>
+            <a:r>
+              <a:rPr lang="en-US"/>
+              <a:t>Third level</a:t>
+            </a:r>
+          </a:p>
+          <a:p>
+            <a:pPr lvl="3"/>
+            <a:r>
+              <a:rPr lang="en-US"/>
+              <a:t>Fourth level</a:t>
+            </a:r>
+          </a:p>
+          <a:p>
+            <a:pPr lvl="4"/>
+            <a:r>
+              <a:rPr lang="en-US"/>
+              <a:t>Fifth level</a:t>
+            </a:r>
+          </a:p>
+        </p:txBody>
+      </p:sp>
+      <p:sp>
+        <p:nvSpPr>
+          <p:cNvPr id="6" name="Footer Placeholder 5"/>
+          <p:cNvSpPr>
+            <a:spLocks noGrp="1"/>
+          </p:cNvSpPr>
+          <p:nvPr>
+            <p:ph type="ftr" sz="quarter" idx="4"/>
+          </p:nvPr>
+        </p:nvSpPr>
+        <p:spPr>
+          <a:xfrm>
+            <a:off x="0" y="8685213"/>
+            <a:ext cx="2971800" cy="458787"/>
+          </a:xfrm>
+          <a:prstGeom prst="rect">
+            <a:avLst/>
+          </a:prstGeom>
+        </p:spPr>
+        <p:txBody>
+          <a:bodyPr vert="horz" lIns="91440" tIns="45720" rIns="91440" bIns="45720" rtlCol="0" anchor="b"/>
+          <a:lstStyle>
+            <a:lvl1pPr algn="l">
+              <a:defRPr sz="1200"/>
+            </a:lvl1pPr>
+          </a:lstStyle>
+          <a:p>
+            <a:endParaRPr lang="en-US"/>
+          </a:p>
+        </p:txBody>
+      </p:sp>
+      <p:sp>
+        <p:nvSpPr>
+          <p:cNvPr id="7" name="Slide Number Placeholder 6"/>
+          <p:cNvSpPr>
+            <a:spLocks noGrp="1"/>
+          </p:cNvSpPr>
+          <p:nvPr>
+            <p:ph type="sldNum" sz="quarter" idx="5"/>
+          </p:nvPr>
+        </p:nvSpPr>
+        <p:spPr>
+          <a:xfrm>
+            <a:off x="3884613" y="8685213"/>
+            <a:ext cx="2971800" cy="458787"/>
+          </a:xfrm>
+          <a:prstGeom prst="rect">
+            <a:avLst/>
+          </a:prstGeom>
+        </p:spPr>
+        <p:txBody>
+          <a:bodyPr vert="horz" lIns="91440" tIns="45720" rIns="91440" bIns="45720" rtlCol="0" anchor="b"/>
+          <a:lstStyle>
+            <a:lvl1pPr algn="r">
+              <a:defRPr sz="1200"/>
+            </a:lvl1pPr>
+          </a:lstStyle>
+          <a:p>
+            <a:fld id="{5678EA10-3FA2-43BD-8A1A-1B73E5FA23F2}" type="slidenum">
+              <a:rPr lang="en-US" smtClean="0"/>
+              <a:t>‹#›</a:t>
+            </a:fld>
+            <a:endParaRPr lang="en-US"/>
+          </a:p>
+        </p:txBody>
+      </p:sp>
+    </p:spTree>
+    <p:extLst>
+      <p:ext uri="{BB962C8B-B14F-4D97-AF65-F5344CB8AC3E}">
+        <p14:creationId xmlns:p14="http://schemas.microsoft.com/office/powerpoint/2010/main" val="782331824"/>
+      </p:ext>
+    </p:extLst>
+  </p:cSld>
+  <p:clrMap bg1="lt1" tx1="dk1" bg2="lt2" tx2="dk2" accent1="accent1" accent2="accent2" accent3="accent3" accent4="accent4" accent5="accent5" accent6="accent6" hlink="hlink" folHlink="folHlink"/>
+  <p:notesStyle>
+    <a:lvl1pPr marL="0" algn="l" defTabSz="914400" rtl="0" eaLnBrk="1" latinLnBrk="0" hangingPunct="1">
+      <a:defRPr sz="1200" kern="1200">
+        <a:solidFill>
+          <a:schemeClr val="tx1"/>
+        </a:solidFill>
+        <a:latin typeface="+mn-lt"/>
+        <a:ea typeface="+mn-ea"/>
+        <a:cs typeface="+mn-cs"/>
+      </a:defRPr>
+    </a:lvl1pPr>
+    <a:lvl2pPr marL="457200" algn="l" defTabSz="914400" rtl="0" eaLnBrk="1" latinLnBrk="0" hangingPunct="1">
+      <a:defRPr sz="1200" kern="1200">
+        <a:solidFill>
+          <a:schemeClr val="tx1"/>
+        </a:solidFill>
+        <a:latin typeface="+mn-lt"/>
+        <a:ea typeface="+mn-ea"/>
+        <a:cs typeface="+mn-cs"/>
+      </a:defRPr>
+    </a:lvl2pPr>
+    <a:lvl3pPr marL="914400" algn="l" defTabSz="914400" rtl="0" eaLnBrk="1" latinLnBrk="0" hangingPunct="1">
+      <a:defRPr sz="1200" kern="1200">
+        <a:solidFill>
+          <a:schemeClr val="tx1"/>
+        </a:solidFill>
+        <a:latin typeface="+mn-lt"/>
+        <a:ea typeface="+mn-ea"/>
+        <a:cs typeface="+mn-cs"/>
+      </a:defRPr>
+    </a:lvl3pPr>
+    <a:lvl4pPr marL="1371600" algn="l" defTabSz="914400" rtl="0" eaLnBrk="1" latinLnBrk="0" hangingPunct="1">
+      <a:defRPr sz="1200" kern="1200">
+        <a:solidFill>
+          <a:schemeClr val="tx1"/>
+        </a:solidFill>
+        <a:latin typeface="+mn-lt"/>
+        <a:ea typeface="+mn-ea"/>
+        <a:cs typeface="+mn-cs"/>
+      </a:defRPr>
+    </a:lvl4pPr>
+    <a:lvl5pPr marL="1828800" algn="l" defTabSz="914400" rtl="0" eaLnBrk="1" latinLnBrk="0" hangingPunct="1">
+      <a:defRPr sz="1200" kern="1200">
+        <a:solidFill>
+          <a:schemeClr val="tx1"/>
+        </a:solidFill>
+        <a:latin typeface="+mn-lt"/>
+        <a:ea typeface="+mn-ea"/>
+        <a:cs typeface="+mn-cs"/>
+      </a:defRPr>
+    </a:lvl5pPr>
+    <a:lvl6pPr marL="2286000" algn="l" defTabSz="914400" rtl="0" eaLnBrk="1" latinLnBrk="0" hangingPunct="1">
+      <a:defRPr sz="1200" kern="1200">
+        <a:solidFill>
+          <a:schemeClr val="tx1"/>
+        </a:solidFill>
+        <a:latin typeface="+mn-lt"/>
+        <a:ea typeface="+mn-ea"/>
+        <a:cs typeface="+mn-cs"/>
+      </a:defRPr>
+    </a:lvl6pPr>
+    <a:lvl7pPr marL="2743200" algn="l" defTabSz="914400" rtl="0" eaLnBrk="1" latinLnBrk="0" hangingPunct="1">
+      <a:defRPr sz="1200" kern="1200">
+        <a:solidFill>
+          <a:schemeClr val="tx1"/>
+        </a:solidFill>
+        <a:latin typeface="+mn-lt"/>
+        <a:ea typeface="+mn-ea"/>
+        <a:cs typeface="+mn-cs"/>
+      </a:defRPr>
+    </a:lvl7pPr>
+    <a:lvl8pPr marL="3200400" algn="l" defTabSz="914400" rtl="0" eaLnBrk="1" latinLnBrk="0" hangingPunct="1">
+      <a:defRPr sz="1200" kern="1200">
+        <a:solidFill>
+          <a:schemeClr val="tx1"/>
+        </a:solidFill>
+        <a:latin typeface="+mn-lt"/>
+        <a:ea typeface="+mn-ea"/>
+        <a:cs typeface="+mn-cs"/>
+      </a:defRPr>
+    </a:lvl8pPr>
+    <a:lvl9pPr marL="3657600" algn="l" defTabSz="914400" rtl="0" eaLnBrk="1" latinLnBrk="0" hangingPunct="1">
+      <a:defRPr sz="1200" kern="1200">
+        <a:solidFill>
+          <a:schemeClr val="tx1"/>
+        </a:solidFill>
+        <a:latin typeface="+mn-lt"/>
+        <a:ea typeface="+mn-ea"/>
+        <a:cs typeface="+mn-cs"/>
+      </a:defRPr>
+    </a:lvl9pPr>
+  </p:notesStyle>
+</p:notesMaster>
+</file>
+
+<file path=ppt/notesSlides/notesSlide1.xml><?xml version="1.0" encoding="utf-8"?>
+<p:notes xmlns:a="http://schemas.openxmlformats.org/drawingml/2006/main" xmlns:r="http://schemas.openxmlformats.org/officeDocument/2006/relationships" xmlns:p="http://schemas.openxmlformats.org/presentationml/2006/main">
+  <p:cSld>
+    <p:spTree>
+      <p:nvGrpSpPr>
+        <p:cNvPr id="1" name=""/>
+        <p:cNvGrpSpPr/>
+        <p:nvPr/>
+      </p:nvGrpSpPr>
+      <p:grpSpPr>
+        <a:xfrm>
+          <a:off x="0" y="0"/>
+          <a:ext cx="0" cy="0"/>
+          <a:chOff x="0" y="0"/>
+          <a:chExt cx="0" cy="0"/>
+        </a:xfrm>
+      </p:grpSpPr>
+      <p:sp>
+        <p:nvSpPr>
+          <p:cNvPr id="2" name="Slide Image Placeholder 1"/>
+          <p:cNvSpPr>
+            <a:spLocks noGrp="1" noRot="1" noChangeAspect="1"/>
+          </p:cNvSpPr>
+          <p:nvPr>
+            <p:ph type="sldImg"/>
+          </p:nvPr>
+        </p:nvSpPr>
+        <p:spPr/>
+      </p:sp>
+      <p:sp>
+        <p:nvSpPr>
+          <p:cNvPr id="3" name="Notes Placeholder 2"/>
+          <p:cNvSpPr>
+            <a:spLocks noGrp="1"/>
+          </p:cNvSpPr>
+          <p:nvPr>
+            <p:ph type="body" idx="1"/>
+          </p:nvPr>
+        </p:nvSpPr>
+        <p:spPr/>
+        <p:txBody>
+          <a:bodyPr/>
+          <a:lstStyle/>
+          <a:p>
+            <a:r>
+              <a:rPr lang="en-US" dirty="0"/>
+              <a:t>La </a:t>
+            </a:r>
+            <a:r>
+              <a:rPr lang="es-US" noProof="0" dirty="0"/>
+              <a:t>verdad</a:t>
+            </a:r>
+            <a:r>
+              <a:rPr lang="en-US" dirty="0"/>
+              <a:t> es que </a:t>
+            </a:r>
+            <a:r>
+              <a:rPr lang="es-US" noProof="0" dirty="0"/>
+              <a:t>ya</a:t>
+            </a:r>
+            <a:r>
+              <a:rPr lang="en-US" dirty="0"/>
+              <a:t> </a:t>
+            </a:r>
+            <a:r>
+              <a:rPr lang="es-US" noProof="0" dirty="0"/>
+              <a:t>existen</a:t>
+            </a:r>
+            <a:r>
+              <a:rPr lang="en-US" dirty="0"/>
+              <a:t> </a:t>
+            </a:r>
+            <a:r>
+              <a:rPr lang="es-US" noProof="0" dirty="0"/>
+              <a:t>tecnologías</a:t>
+            </a:r>
+            <a:r>
+              <a:rPr lang="en-US" dirty="0"/>
+              <a:t> </a:t>
+            </a:r>
+            <a:r>
+              <a:rPr lang="es-US" noProof="0" dirty="0"/>
+              <a:t>que</a:t>
+            </a:r>
+            <a:r>
+              <a:rPr lang="en-US" dirty="0"/>
+              <a:t> </a:t>
+            </a:r>
+            <a:r>
+              <a:rPr lang="es-US" noProof="0" dirty="0"/>
+              <a:t>pueden</a:t>
+            </a:r>
+            <a:r>
+              <a:rPr lang="en-US" dirty="0"/>
+              <a:t> de </a:t>
+            </a:r>
+            <a:r>
+              <a:rPr lang="es-US" noProof="0" dirty="0"/>
+              <a:t>cierta</a:t>
+            </a:r>
+            <a:r>
+              <a:rPr lang="en-US" dirty="0"/>
+              <a:t> forma </a:t>
+            </a:r>
+            <a:r>
+              <a:rPr lang="es-US" noProof="0" dirty="0"/>
+              <a:t>ayudarnos</a:t>
+            </a:r>
+            <a:r>
+              <a:rPr lang="en-US" dirty="0"/>
+              <a:t> con </a:t>
+            </a:r>
+            <a:r>
+              <a:rPr lang="es-US" noProof="0" dirty="0"/>
+              <a:t>esto</a:t>
+            </a:r>
+            <a:r>
+              <a:rPr lang="en-US" dirty="0"/>
+              <a:t> </a:t>
+            </a:r>
+            <a:r>
+              <a:rPr lang="es-US" noProof="0" dirty="0"/>
+              <a:t>como</a:t>
+            </a:r>
+            <a:r>
+              <a:rPr lang="en-US" dirty="0"/>
+              <a:t> Ionic, React Native y Xamarin.</a:t>
+            </a:r>
+          </a:p>
+          <a:p>
+            <a:r>
+              <a:rPr lang="en-US" dirty="0"/>
+              <a:t>1 – Ionic  </a:t>
+            </a:r>
+            <a:r>
+              <a:rPr lang="en-US" dirty="0" err="1"/>
+              <a:t>utiliza</a:t>
+            </a:r>
+            <a:r>
+              <a:rPr lang="en-US" dirty="0"/>
+              <a:t> un </a:t>
+            </a:r>
+            <a:r>
+              <a:rPr lang="en-US" dirty="0" err="1"/>
+              <a:t>webview</a:t>
+            </a:r>
+            <a:r>
+              <a:rPr lang="en-US" dirty="0"/>
+              <a:t> lo </a:t>
+            </a:r>
+            <a:r>
+              <a:rPr lang="en-US" dirty="0" err="1"/>
+              <a:t>cual</a:t>
+            </a:r>
+            <a:r>
+              <a:rPr lang="en-US" dirty="0"/>
+              <a:t> </a:t>
+            </a:r>
+            <a:r>
+              <a:rPr lang="en-US" dirty="0" err="1"/>
+              <a:t>hace</a:t>
+            </a:r>
+            <a:r>
+              <a:rPr lang="en-US" dirty="0"/>
+              <a:t> que sus </a:t>
+            </a:r>
+            <a:r>
+              <a:rPr lang="en-US" dirty="0" err="1"/>
+              <a:t>aplicaciones</a:t>
+            </a:r>
+            <a:r>
+              <a:rPr lang="en-US" dirty="0"/>
+              <a:t> </a:t>
+            </a:r>
+            <a:r>
+              <a:rPr lang="en-US" dirty="0" err="1"/>
+              <a:t>sean</a:t>
+            </a:r>
+            <a:r>
+              <a:rPr lang="en-US" dirty="0"/>
+              <a:t> un </a:t>
+            </a:r>
+            <a:r>
+              <a:rPr lang="en-US" dirty="0" err="1"/>
+              <a:t>poco</a:t>
+            </a:r>
+            <a:r>
+              <a:rPr lang="en-US" dirty="0"/>
+              <a:t> m</a:t>
+            </a:r>
+            <a:r>
+              <a:rPr lang="es-US" dirty="0"/>
+              <a:t>á</a:t>
+            </a:r>
+            <a:r>
+              <a:rPr lang="en-US" dirty="0"/>
+              <a:t>s </a:t>
+            </a:r>
+            <a:r>
+              <a:rPr lang="en-US" dirty="0" err="1"/>
+              <a:t>lentas</a:t>
+            </a:r>
+            <a:r>
+              <a:rPr lang="en-US" dirty="0"/>
+              <a:t> y la </a:t>
+            </a:r>
+            <a:r>
+              <a:rPr lang="en-US" dirty="0" err="1"/>
+              <a:t>integración</a:t>
+            </a:r>
+            <a:r>
+              <a:rPr lang="en-US" dirty="0"/>
+              <a:t> con los components </a:t>
+            </a:r>
+            <a:r>
+              <a:rPr lang="en-US" dirty="0" err="1"/>
+              <a:t>nativos</a:t>
+            </a:r>
+            <a:r>
+              <a:rPr lang="en-US" dirty="0"/>
+              <a:t> </a:t>
+            </a:r>
+            <a:r>
+              <a:rPr lang="en-US" dirty="0" err="1"/>
+              <a:t>utiliza</a:t>
+            </a:r>
+            <a:r>
+              <a:rPr lang="en-US" dirty="0"/>
+              <a:t> </a:t>
+            </a:r>
+            <a:r>
+              <a:rPr lang="en-US" dirty="0" err="1"/>
+              <a:t>cordova</a:t>
+            </a:r>
+            <a:r>
+              <a:rPr lang="en-US" dirty="0"/>
+              <a:t> el </a:t>
+            </a:r>
+            <a:r>
+              <a:rPr lang="en-US" dirty="0" err="1"/>
+              <a:t>cual</a:t>
+            </a:r>
+            <a:r>
+              <a:rPr lang="en-US" dirty="0"/>
+              <a:t> </a:t>
+            </a:r>
+            <a:r>
+              <a:rPr lang="en-US" dirty="0" err="1"/>
+              <a:t>en</a:t>
+            </a:r>
+            <a:r>
+              <a:rPr lang="en-US" dirty="0"/>
+              <a:t> mi opinion </a:t>
+            </a:r>
+            <a:r>
+              <a:rPr lang="en-US" dirty="0" err="1"/>
+              <a:t>en</a:t>
+            </a:r>
+            <a:r>
+              <a:rPr lang="en-US" dirty="0"/>
+              <a:t> </a:t>
+            </a:r>
+            <a:r>
+              <a:rPr lang="en-US" dirty="0" err="1"/>
+              <a:t>muchos</a:t>
+            </a:r>
+            <a:r>
+              <a:rPr lang="en-US" dirty="0"/>
+              <a:t> de sus plugins le </a:t>
+            </a:r>
+            <a:r>
+              <a:rPr lang="en-US" dirty="0" err="1"/>
+              <a:t>falta</a:t>
+            </a:r>
+            <a:r>
+              <a:rPr lang="en-US" dirty="0"/>
+              <a:t> ese toque final que </a:t>
+            </a:r>
+            <a:r>
+              <a:rPr lang="en-US" dirty="0" err="1"/>
+              <a:t>hace</a:t>
+            </a:r>
+            <a:r>
+              <a:rPr lang="en-US" dirty="0"/>
+              <a:t> </a:t>
+            </a:r>
+            <a:r>
+              <a:rPr lang="en-US" dirty="0" err="1"/>
+              <a:t>desear</a:t>
+            </a:r>
+            <a:r>
+              <a:rPr lang="en-US" dirty="0"/>
+              <a:t> </a:t>
+            </a:r>
+            <a:r>
+              <a:rPr lang="en-US" dirty="0" err="1"/>
+              <a:t>utilizarlos</a:t>
+            </a:r>
+            <a:r>
+              <a:rPr lang="en-US" dirty="0"/>
+              <a:t>.</a:t>
+            </a:r>
+          </a:p>
+          <a:p>
+            <a:endParaRPr lang="en-US" dirty="0"/>
+          </a:p>
+          <a:p>
+            <a:r>
+              <a:rPr lang="en-US" dirty="0"/>
+              <a:t>2 – React native es el mas </a:t>
+            </a:r>
+            <a:r>
+              <a:rPr lang="en-US" dirty="0" err="1"/>
+              <a:t>cercano</a:t>
+            </a:r>
+            <a:r>
+              <a:rPr lang="en-US" dirty="0"/>
+              <a:t> a flutter </a:t>
+            </a:r>
+            <a:r>
+              <a:rPr lang="en-US" dirty="0" err="1"/>
+              <a:t>pero</a:t>
+            </a:r>
+            <a:r>
+              <a:rPr lang="en-US" dirty="0"/>
+              <a:t> </a:t>
+            </a:r>
+            <a:r>
+              <a:rPr lang="en-US" dirty="0" err="1"/>
+              <a:t>sigue</a:t>
+            </a:r>
+            <a:r>
+              <a:rPr lang="en-US" dirty="0"/>
+              <a:t> sin ser native </a:t>
+            </a:r>
+            <a:r>
+              <a:rPr lang="en-US" dirty="0" err="1"/>
+              <a:t>pues</a:t>
+            </a:r>
+            <a:r>
+              <a:rPr lang="en-US" dirty="0"/>
+              <a:t> </a:t>
+            </a:r>
+            <a:r>
+              <a:rPr lang="en-US" dirty="0" err="1"/>
+              <a:t>tiene</a:t>
+            </a:r>
+            <a:r>
+              <a:rPr lang="en-US" dirty="0"/>
+              <a:t> un bridge que </a:t>
+            </a:r>
+            <a:r>
+              <a:rPr lang="en-US" dirty="0" err="1"/>
+              <a:t>interpreta</a:t>
+            </a:r>
+            <a:r>
+              <a:rPr lang="en-US" dirty="0"/>
+              <a:t> entre el </a:t>
+            </a:r>
+            <a:r>
+              <a:rPr lang="en-US" dirty="0" err="1"/>
+              <a:t>js</a:t>
+            </a:r>
+            <a:r>
+              <a:rPr lang="en-US" dirty="0"/>
+              <a:t> y los </a:t>
+            </a:r>
+            <a:r>
+              <a:rPr lang="en-US" dirty="0" err="1"/>
+              <a:t>elementos</a:t>
+            </a:r>
+            <a:r>
+              <a:rPr lang="en-US" dirty="0"/>
+              <a:t> native, </a:t>
+            </a:r>
+            <a:r>
+              <a:rPr lang="en-US" dirty="0" err="1"/>
+              <a:t>algo</a:t>
+            </a:r>
+            <a:r>
+              <a:rPr lang="en-US" dirty="0"/>
+              <a:t> que </a:t>
+            </a:r>
+            <a:r>
+              <a:rPr lang="en-US" dirty="0" err="1"/>
+              <a:t>personalmente</a:t>
+            </a:r>
+            <a:r>
+              <a:rPr lang="en-US" dirty="0"/>
+              <a:t> a mi me </a:t>
+            </a:r>
+            <a:r>
+              <a:rPr lang="en-US" dirty="0" err="1"/>
+              <a:t>golpea</a:t>
+            </a:r>
+            <a:r>
+              <a:rPr lang="en-US" dirty="0"/>
+              <a:t> </a:t>
+            </a:r>
+            <a:r>
+              <a:rPr lang="en-US" dirty="0" err="1"/>
+              <a:t>mucho</a:t>
+            </a:r>
+            <a:r>
+              <a:rPr lang="en-US" dirty="0"/>
+              <a:t> </a:t>
+            </a:r>
+            <a:r>
+              <a:rPr lang="en-US" dirty="0" err="1"/>
+              <a:t>cuando</a:t>
+            </a:r>
+            <a:r>
+              <a:rPr lang="en-US" dirty="0"/>
+              <a:t> </a:t>
+            </a:r>
+            <a:r>
+              <a:rPr lang="en-US" dirty="0" err="1"/>
+              <a:t>desarrollaba</a:t>
+            </a:r>
+            <a:r>
+              <a:rPr lang="en-US" dirty="0"/>
+              <a:t> con react es </a:t>
+            </a:r>
+            <a:r>
+              <a:rPr lang="en-US" dirty="0" err="1"/>
+              <a:t>como</a:t>
+            </a:r>
+            <a:r>
+              <a:rPr lang="en-US" dirty="0"/>
+              <a:t> la </a:t>
+            </a:r>
+            <a:r>
+              <a:rPr lang="en-US" dirty="0" err="1"/>
+              <a:t>mayoria</a:t>
+            </a:r>
+            <a:r>
+              <a:rPr lang="en-US" dirty="0"/>
+              <a:t> de los plugins y </a:t>
+            </a:r>
+            <a:r>
+              <a:rPr lang="en-US" dirty="0" err="1"/>
+              <a:t>librerías</a:t>
+            </a:r>
+            <a:r>
+              <a:rPr lang="en-US" dirty="0"/>
+              <a:t> son de </a:t>
+            </a:r>
+            <a:r>
+              <a:rPr lang="en-US" dirty="0" err="1"/>
+              <a:t>terceros</a:t>
+            </a:r>
+            <a:r>
+              <a:rPr lang="en-US" dirty="0"/>
+              <a:t> a la hora de </a:t>
+            </a:r>
+            <a:r>
+              <a:rPr lang="en-US" dirty="0" err="1"/>
+              <a:t>generar</a:t>
+            </a:r>
+            <a:r>
+              <a:rPr lang="en-US" dirty="0"/>
+              <a:t> un  release o </a:t>
+            </a:r>
+            <a:r>
+              <a:rPr lang="en-US" dirty="0" err="1"/>
+              <a:t>compilar</a:t>
+            </a:r>
+            <a:r>
+              <a:rPr lang="en-US" dirty="0"/>
+              <a:t> </a:t>
+            </a:r>
+            <a:r>
+              <a:rPr lang="en-US" dirty="0" err="1"/>
+              <a:t>siempre</a:t>
+            </a:r>
+            <a:r>
+              <a:rPr lang="en-US" dirty="0"/>
+              <a:t> tenia que </a:t>
+            </a:r>
+            <a:r>
+              <a:rPr lang="en-US" dirty="0" err="1"/>
+              <a:t>lidiar</a:t>
+            </a:r>
+            <a:r>
+              <a:rPr lang="en-US" dirty="0"/>
+              <a:t> con los breaking change </a:t>
+            </a:r>
+            <a:r>
+              <a:rPr lang="en-US" dirty="0" err="1"/>
+              <a:t>pues</a:t>
+            </a:r>
+            <a:r>
+              <a:rPr lang="en-US" dirty="0"/>
+              <a:t> </a:t>
+            </a:r>
+            <a:r>
+              <a:rPr lang="en-US" dirty="0" err="1"/>
+              <a:t>alguna</a:t>
+            </a:r>
+            <a:r>
+              <a:rPr lang="en-US" dirty="0"/>
+              <a:t> de mis </a:t>
+            </a:r>
+            <a:r>
+              <a:rPr lang="en-US" dirty="0" err="1"/>
+              <a:t>dependencias</a:t>
+            </a:r>
+            <a:r>
+              <a:rPr lang="en-US" dirty="0"/>
+              <a:t> </a:t>
+            </a:r>
+            <a:r>
+              <a:rPr lang="en-US" dirty="0" err="1"/>
+              <a:t>estaba</a:t>
+            </a:r>
+            <a:r>
+              <a:rPr lang="en-US" dirty="0"/>
+              <a:t> </a:t>
+            </a:r>
+            <a:r>
+              <a:rPr lang="en-US" dirty="0" err="1"/>
+              <a:t>rota</a:t>
+            </a:r>
+            <a:r>
+              <a:rPr lang="en-US" dirty="0"/>
+              <a:t>.</a:t>
+            </a:r>
+          </a:p>
+          <a:p>
+            <a:endParaRPr lang="en-US" dirty="0"/>
+          </a:p>
+          <a:p>
+            <a:r>
+              <a:rPr lang="en-US" dirty="0"/>
+              <a:t>3 – Xamarin – no </a:t>
+            </a:r>
+            <a:r>
+              <a:rPr lang="en-US" dirty="0" err="1"/>
+              <a:t>tengo</a:t>
+            </a:r>
+            <a:r>
+              <a:rPr lang="en-US" dirty="0"/>
+              <a:t> </a:t>
+            </a:r>
+            <a:r>
+              <a:rPr lang="en-US" dirty="0" err="1"/>
+              <a:t>mucha</a:t>
+            </a:r>
+            <a:r>
+              <a:rPr lang="en-US" dirty="0"/>
+              <a:t> </a:t>
+            </a:r>
+            <a:r>
+              <a:rPr lang="en-US" dirty="0" err="1"/>
+              <a:t>experiencia</a:t>
+            </a:r>
+            <a:r>
+              <a:rPr lang="en-US" dirty="0"/>
+              <a:t> a </a:t>
+            </a:r>
+            <a:r>
+              <a:rPr lang="en-US" dirty="0" err="1"/>
+              <a:t>decir</a:t>
+            </a:r>
+            <a:r>
+              <a:rPr lang="en-US" dirty="0"/>
+              <a:t> </a:t>
+            </a:r>
+            <a:r>
+              <a:rPr lang="en-US" dirty="0" err="1"/>
+              <a:t>verdad</a:t>
+            </a:r>
+            <a:r>
+              <a:rPr lang="en-US" dirty="0"/>
+              <a:t> </a:t>
+            </a:r>
+            <a:r>
+              <a:rPr lang="en-US" dirty="0" err="1"/>
+              <a:t>casi</a:t>
+            </a:r>
+            <a:r>
+              <a:rPr lang="en-US" dirty="0"/>
+              <a:t> </a:t>
+            </a:r>
+            <a:r>
+              <a:rPr lang="en-US" dirty="0" err="1"/>
+              <a:t>nula</a:t>
+            </a:r>
+            <a:r>
+              <a:rPr lang="en-US" dirty="0"/>
+              <a:t>.</a:t>
+            </a:r>
+          </a:p>
+          <a:p>
+            <a:endParaRPr lang="en-US" dirty="0"/>
+          </a:p>
+          <a:p>
+            <a:r>
+              <a:rPr lang="en-US" dirty="0"/>
+              <a:t>------------------------------------------------</a:t>
+            </a:r>
+          </a:p>
+          <a:p>
+            <a:endParaRPr lang="en-US" dirty="0"/>
+          </a:p>
+          <a:p>
+            <a:r>
+              <a:rPr lang="en-US" dirty="0"/>
+              <a:t>1 – Ionic Podemos utilizer el </a:t>
+            </a:r>
+            <a:r>
+              <a:rPr lang="en-US" dirty="0" err="1"/>
+              <a:t>navegador</a:t>
+            </a:r>
+            <a:r>
+              <a:rPr lang="en-US" dirty="0"/>
+              <a:t> </a:t>
+            </a:r>
+            <a:r>
+              <a:rPr lang="en-US" dirty="0" err="1"/>
+              <a:t>asi</a:t>
+            </a:r>
+            <a:r>
+              <a:rPr lang="en-US" dirty="0"/>
+              <a:t> </a:t>
+            </a:r>
+            <a:r>
+              <a:rPr lang="en-US" dirty="0" err="1"/>
+              <a:t>prototipamos</a:t>
+            </a:r>
+            <a:r>
+              <a:rPr lang="en-US" dirty="0"/>
+              <a:t> de forma </a:t>
+            </a:r>
+            <a:r>
+              <a:rPr lang="en-US" dirty="0" err="1"/>
+              <a:t>acelerada</a:t>
+            </a:r>
+            <a:r>
+              <a:rPr lang="en-US" dirty="0"/>
+              <a:t> y temenos feedback </a:t>
+            </a:r>
+            <a:r>
+              <a:rPr lang="en-US" dirty="0" err="1"/>
+              <a:t>casi</a:t>
+            </a:r>
+            <a:r>
+              <a:rPr lang="en-US" dirty="0"/>
+              <a:t> al </a:t>
+            </a:r>
+            <a:r>
+              <a:rPr lang="en-US" dirty="0" err="1"/>
+              <a:t>instante</a:t>
+            </a:r>
+            <a:r>
+              <a:rPr lang="en-US" dirty="0"/>
+              <a:t> </a:t>
+            </a:r>
+            <a:r>
+              <a:rPr lang="en-US" dirty="0" err="1"/>
+              <a:t>donde</a:t>
+            </a:r>
+            <a:r>
+              <a:rPr lang="en-US" dirty="0"/>
+              <a:t> </a:t>
+            </a:r>
+            <a:r>
+              <a:rPr lang="en-US" dirty="0" err="1"/>
+              <a:t>vienen</a:t>
+            </a:r>
+            <a:r>
+              <a:rPr lang="en-US" dirty="0"/>
+              <a:t> los </a:t>
+            </a:r>
+            <a:r>
+              <a:rPr lang="en-US" dirty="0" err="1"/>
+              <a:t>dolores</a:t>
+            </a:r>
+            <a:r>
+              <a:rPr lang="en-US" dirty="0"/>
+              <a:t> de cabeza </a:t>
+            </a:r>
+            <a:r>
+              <a:rPr lang="en-US" dirty="0" err="1"/>
+              <a:t>cuando</a:t>
+            </a:r>
+            <a:r>
+              <a:rPr lang="en-US" dirty="0"/>
+              <a:t> </a:t>
+            </a:r>
+            <a:r>
+              <a:rPr lang="en-US" dirty="0" err="1"/>
+              <a:t>probamos</a:t>
+            </a:r>
+            <a:r>
+              <a:rPr lang="en-US" dirty="0"/>
+              <a:t> </a:t>
+            </a:r>
+            <a:r>
+              <a:rPr lang="en-US" dirty="0" err="1"/>
+              <a:t>en</a:t>
+            </a:r>
+            <a:r>
+              <a:rPr lang="en-US" dirty="0"/>
+              <a:t> los </a:t>
+            </a:r>
+            <a:r>
+              <a:rPr lang="en-US" dirty="0" err="1"/>
+              <a:t>dispositivos</a:t>
+            </a:r>
+            <a:r>
+              <a:rPr lang="en-US" dirty="0"/>
+              <a:t>.</a:t>
+            </a:r>
+          </a:p>
+          <a:p>
+            <a:r>
+              <a:rPr lang="en-US" dirty="0"/>
+              <a:t> </a:t>
+            </a:r>
+            <a:r>
+              <a:rPr lang="en-US" dirty="0" err="1"/>
+              <a:t>generar</a:t>
+            </a:r>
+            <a:r>
+              <a:rPr lang="en-US" dirty="0"/>
+              <a:t> un build con ionic </a:t>
+            </a:r>
+            <a:r>
+              <a:rPr lang="en-US" dirty="0" err="1"/>
+              <a:t>demora</a:t>
+            </a:r>
+            <a:r>
+              <a:rPr lang="en-US" dirty="0"/>
+              <a:t> una </a:t>
+            </a:r>
+            <a:r>
+              <a:rPr lang="en-US" dirty="0" err="1"/>
+              <a:t>eternidad</a:t>
+            </a:r>
+            <a:r>
+              <a:rPr lang="en-US" dirty="0"/>
+              <a:t> </a:t>
+            </a:r>
+          </a:p>
+          <a:p>
+            <a:r>
+              <a:rPr lang="en-US" dirty="0" err="1"/>
+              <a:t>siempre</a:t>
+            </a:r>
+            <a:r>
+              <a:rPr lang="en-US" dirty="0"/>
+              <a:t> hay que </a:t>
+            </a:r>
+            <a:r>
+              <a:rPr lang="en-US" dirty="0" err="1"/>
+              <a:t>retocar</a:t>
+            </a:r>
+            <a:r>
+              <a:rPr lang="en-US" dirty="0"/>
+              <a:t> </a:t>
+            </a:r>
+            <a:r>
+              <a:rPr lang="en-US" dirty="0" err="1"/>
+              <a:t>estilos</a:t>
+            </a:r>
+            <a:r>
+              <a:rPr lang="en-US" dirty="0"/>
+              <a:t> </a:t>
+            </a:r>
+          </a:p>
+          <a:p>
+            <a:endParaRPr lang="en-US" dirty="0"/>
+          </a:p>
+          <a:p>
+            <a:r>
+              <a:rPr lang="en-US" dirty="0"/>
+              <a:t>2 – </a:t>
+            </a:r>
+            <a:r>
+              <a:rPr lang="en-US" dirty="0" err="1"/>
+              <a:t>en</a:t>
+            </a:r>
+            <a:r>
+              <a:rPr lang="en-US" dirty="0"/>
+              <a:t> react native no </a:t>
+            </a:r>
+            <a:r>
+              <a:rPr lang="en-US" dirty="0" err="1"/>
+              <a:t>demora</a:t>
+            </a:r>
+            <a:r>
+              <a:rPr lang="en-US" dirty="0"/>
+              <a:t> tanto </a:t>
+            </a:r>
+            <a:r>
+              <a:rPr lang="en-US" dirty="0" err="1"/>
+              <a:t>ya</a:t>
+            </a:r>
+            <a:r>
+              <a:rPr lang="en-US" dirty="0"/>
+              <a:t> que </a:t>
+            </a:r>
+            <a:r>
+              <a:rPr lang="en-US" dirty="0" err="1"/>
+              <a:t>debes</a:t>
+            </a:r>
+            <a:r>
+              <a:rPr lang="en-US" dirty="0"/>
+              <a:t> </a:t>
+            </a:r>
+            <a:r>
+              <a:rPr lang="en-US" dirty="0" err="1"/>
+              <a:t>desarrollar</a:t>
+            </a:r>
+            <a:r>
+              <a:rPr lang="en-US" dirty="0"/>
+              <a:t> </a:t>
+            </a:r>
+            <a:r>
+              <a:rPr lang="en-US" dirty="0" err="1"/>
+              <a:t>utilizando</a:t>
+            </a:r>
+            <a:r>
+              <a:rPr lang="en-US" dirty="0"/>
+              <a:t> el </a:t>
+            </a:r>
+            <a:r>
+              <a:rPr lang="en-US" dirty="0" err="1"/>
+              <a:t>emulador</a:t>
+            </a:r>
+            <a:r>
+              <a:rPr lang="en-US" dirty="0"/>
+              <a:t> o un </a:t>
+            </a:r>
+            <a:r>
+              <a:rPr lang="en-US" dirty="0" err="1"/>
+              <a:t>telefono</a:t>
+            </a:r>
+            <a:r>
+              <a:rPr lang="en-US" dirty="0"/>
+              <a:t> real </a:t>
+            </a:r>
+            <a:r>
+              <a:rPr lang="en-US" dirty="0" err="1"/>
+              <a:t>pero</a:t>
+            </a:r>
+            <a:r>
+              <a:rPr lang="en-US" dirty="0"/>
+              <a:t> </a:t>
+            </a:r>
+            <a:r>
+              <a:rPr lang="en-US" dirty="0" err="1"/>
+              <a:t>nunca</a:t>
+            </a:r>
+            <a:r>
+              <a:rPr lang="en-US" dirty="0"/>
+              <a:t> se </a:t>
+            </a:r>
+            <a:r>
+              <a:rPr lang="en-US" dirty="0" err="1"/>
+              <a:t>acerca</a:t>
+            </a:r>
+            <a:r>
+              <a:rPr lang="en-US" dirty="0"/>
+              <a:t> los </a:t>
+            </a:r>
+            <a:r>
+              <a:rPr lang="en-US" dirty="0" err="1"/>
+              <a:t>tiempos</a:t>
+            </a:r>
+            <a:r>
+              <a:rPr lang="en-US" dirty="0"/>
+              <a:t> de </a:t>
+            </a:r>
+            <a:r>
+              <a:rPr lang="en-US" dirty="0" err="1"/>
+              <a:t>respuesta</a:t>
+            </a:r>
+            <a:r>
+              <a:rPr lang="en-US" dirty="0"/>
+              <a:t> del hot reload de flutter solo </a:t>
+            </a:r>
+            <a:r>
+              <a:rPr lang="en-US" dirty="0" err="1"/>
+              <a:t>mensionando</a:t>
+            </a:r>
+            <a:r>
+              <a:rPr lang="en-US" dirty="0"/>
+              <a:t> el </a:t>
+            </a:r>
+            <a:r>
+              <a:rPr lang="en-US" dirty="0" err="1"/>
+              <a:t>tiempo</a:t>
+            </a:r>
+            <a:r>
+              <a:rPr lang="en-US" dirty="0"/>
+              <a:t> </a:t>
+            </a:r>
+            <a:r>
+              <a:rPr lang="en-US" dirty="0" err="1"/>
+              <a:t>pues</a:t>
+            </a:r>
+            <a:r>
+              <a:rPr lang="en-US" dirty="0"/>
+              <a:t> la </a:t>
+            </a:r>
+            <a:r>
+              <a:rPr lang="en-US" dirty="0" err="1"/>
+              <a:t>funcionalidad</a:t>
+            </a:r>
+            <a:r>
+              <a:rPr lang="en-US" dirty="0"/>
+              <a:t> complete no es </a:t>
+            </a:r>
+            <a:r>
+              <a:rPr lang="en-US" dirty="0" err="1"/>
+              <a:t>implementada</a:t>
+            </a:r>
+            <a:r>
+              <a:rPr lang="en-US" dirty="0"/>
+              <a:t>.</a:t>
+            </a:r>
+          </a:p>
+        </p:txBody>
+      </p:sp>
+      <p:sp>
+        <p:nvSpPr>
+          <p:cNvPr id="4" name="Slide Number Placeholder 3"/>
+          <p:cNvSpPr>
+            <a:spLocks noGrp="1"/>
+          </p:cNvSpPr>
+          <p:nvPr>
+            <p:ph type="sldNum" sz="quarter" idx="5"/>
+          </p:nvPr>
+        </p:nvSpPr>
+        <p:spPr/>
+        <p:txBody>
+          <a:bodyPr/>
+          <a:lstStyle/>
+          <a:p>
+            <a:fld id="{5678EA10-3FA2-43BD-8A1A-1B73E5FA23F2}" type="slidenum">
+              <a:rPr lang="en-US" smtClean="0"/>
+              <a:t>7</a:t>
+            </a:fld>
+            <a:endParaRPr lang="en-US"/>
+          </a:p>
+        </p:txBody>
+      </p:sp>
+    </p:spTree>
+    <p:extLst>
+      <p:ext uri="{BB962C8B-B14F-4D97-AF65-F5344CB8AC3E}">
+        <p14:creationId xmlns:p14="http://schemas.microsoft.com/office/powerpoint/2010/main" val="1166101127"/>
+      </p:ext>
+    </p:extLst>
+  </p:cSld>
+  <p:clrMapOvr>
+    <a:masterClrMapping/>
+  </p:clrMapOvr>
+</p:notes>
+</file>
+
+<file path=ppt/notesSlides/notesSlide2.xml><?xml version="1.0" encoding="utf-8"?>
+<p:notes xmlns:a="http://schemas.openxmlformats.org/drawingml/2006/main" xmlns:r="http://schemas.openxmlformats.org/officeDocument/2006/relationships" xmlns:p="http://schemas.openxmlformats.org/presentationml/2006/main">
+  <p:cSld>
+    <p:spTree>
+      <p:nvGrpSpPr>
+        <p:cNvPr id="1" name=""/>
+        <p:cNvGrpSpPr/>
+        <p:nvPr/>
+      </p:nvGrpSpPr>
+      <p:grpSpPr>
+        <a:xfrm>
+          <a:off x="0" y="0"/>
+          <a:ext cx="0" cy="0"/>
+          <a:chOff x="0" y="0"/>
+          <a:chExt cx="0" cy="0"/>
+        </a:xfrm>
+      </p:grpSpPr>
+      <p:sp>
+        <p:nvSpPr>
+          <p:cNvPr id="2" name="Slide Image Placeholder 1"/>
+          <p:cNvSpPr>
+            <a:spLocks noGrp="1" noRot="1" noChangeAspect="1"/>
+          </p:cNvSpPr>
+          <p:nvPr>
+            <p:ph type="sldImg"/>
+          </p:nvPr>
+        </p:nvSpPr>
+        <p:spPr/>
+      </p:sp>
+      <p:sp>
+        <p:nvSpPr>
+          <p:cNvPr id="3" name="Notes Placeholder 2"/>
+          <p:cNvSpPr>
+            <a:spLocks noGrp="1"/>
+          </p:cNvSpPr>
+          <p:nvPr>
+            <p:ph type="body" idx="1"/>
+          </p:nvPr>
+        </p:nvSpPr>
+        <p:spPr/>
+        <p:txBody>
+          <a:bodyPr/>
+          <a:lstStyle/>
+          <a:p>
+            <a:endParaRPr lang="en-US" dirty="0"/>
+          </a:p>
+        </p:txBody>
+      </p:sp>
+      <p:sp>
+        <p:nvSpPr>
+          <p:cNvPr id="4" name="Slide Number Placeholder 3"/>
+          <p:cNvSpPr>
+            <a:spLocks noGrp="1"/>
+          </p:cNvSpPr>
+          <p:nvPr>
+            <p:ph type="sldNum" sz="quarter" idx="5"/>
+          </p:nvPr>
+        </p:nvSpPr>
+        <p:spPr/>
+        <p:txBody>
+          <a:bodyPr/>
+          <a:lstStyle/>
+          <a:p>
+            <a:fld id="{5678EA10-3FA2-43BD-8A1A-1B73E5FA23F2}" type="slidenum">
+              <a:rPr lang="en-US" smtClean="0"/>
+              <a:t>8</a:t>
+            </a:fld>
+            <a:endParaRPr lang="en-US"/>
+          </a:p>
+        </p:txBody>
+      </p:sp>
+    </p:spTree>
+    <p:extLst>
+      <p:ext uri="{BB962C8B-B14F-4D97-AF65-F5344CB8AC3E}">
+        <p14:creationId xmlns:p14="http://schemas.microsoft.com/office/powerpoint/2010/main" val="3407720247"/>
+      </p:ext>
+    </p:extLst>
+  </p:cSld>
+  <p:clrMapOvr>
+    <a:masterClrMapping/>
+  </p:clrMapOvr>
+</p:notes>
+</file>
+
 <file path=ppt/slideLayouts/slideLayout1.xml><?xml version="1.0" encoding="utf-8"?>
 <p:sldLayout xmlns:a="http://schemas.openxmlformats.org/drawingml/2006/main" xmlns:r="http://schemas.openxmlformats.org/officeDocument/2006/relationships" xmlns:p="http://schemas.openxmlformats.org/presentationml/2006/main" type="title" preserve="1">
   <p:cSld name="Title Slide">
@@ -264,7 +1664,7 @@
           <a:p>
             <a:fld id="{BDB340C8-6E77-45F4-B009-4185183E7707}" type="datetimeFigureOut">
               <a:rPr lang="en-US" smtClean="0"/>
-              <a:t>4/29/2019</a:t>
+              <a:t>5/27/2019</a:t>
             </a:fld>
             <a:endParaRPr lang="en-US"/>
           </a:p>
@@ -462,7 +1862,7 @@
           <a:p>
             <a:fld id="{BDB340C8-6E77-45F4-B009-4185183E7707}" type="datetimeFigureOut">
               <a:rPr lang="en-US" smtClean="0"/>
-              <a:t>4/29/2019</a:t>
+              <a:t>5/27/2019</a:t>
             </a:fld>
             <a:endParaRPr lang="en-US"/>
           </a:p>
@@ -670,7 +2070,7 @@
           <a:p>
             <a:fld id="{BDB340C8-6E77-45F4-B009-4185183E7707}" type="datetimeFigureOut">
               <a:rPr lang="en-US" smtClean="0"/>
-              <a:t>4/29/2019</a:t>
+              <a:t>5/27/2019</a:t>
             </a:fld>
             <a:endParaRPr lang="en-US"/>
           </a:p>
@@ -868,7 +2268,7 @@
           <a:p>
             <a:fld id="{BDB340C8-6E77-45F4-B009-4185183E7707}" type="datetimeFigureOut">
               <a:rPr lang="en-US" smtClean="0"/>
-              <a:t>4/29/2019</a:t>
+              <a:t>5/27/2019</a:t>
             </a:fld>
             <a:endParaRPr lang="en-US"/>
           </a:p>
@@ -1143,7 +2543,7 @@
           <a:p>
             <a:fld id="{BDB340C8-6E77-45F4-B009-4185183E7707}" type="datetimeFigureOut">
               <a:rPr lang="en-US" smtClean="0"/>
-              <a:t>4/29/2019</a:t>
+              <a:t>5/27/2019</a:t>
             </a:fld>
             <a:endParaRPr lang="en-US"/>
           </a:p>
@@ -1408,7 +2808,7 @@
           <a:p>
             <a:fld id="{BDB340C8-6E77-45F4-B009-4185183E7707}" type="datetimeFigureOut">
               <a:rPr lang="en-US" smtClean="0"/>
-              <a:t>4/29/2019</a:t>
+              <a:t>5/27/2019</a:t>
             </a:fld>
             <a:endParaRPr lang="en-US"/>
           </a:p>
@@ -1820,7 +3220,7 @@
           <a:p>
             <a:fld id="{BDB340C8-6E77-45F4-B009-4185183E7707}" type="datetimeFigureOut">
               <a:rPr lang="en-US" smtClean="0"/>
-              <a:t>4/29/2019</a:t>
+              <a:t>5/27/2019</a:t>
             </a:fld>
             <a:endParaRPr lang="en-US"/>
           </a:p>
@@ -1961,7 +3361,7 @@
           <a:p>
             <a:fld id="{BDB340C8-6E77-45F4-B009-4185183E7707}" type="datetimeFigureOut">
               <a:rPr lang="en-US" smtClean="0"/>
-              <a:t>4/29/2019</a:t>
+              <a:t>5/27/2019</a:t>
             </a:fld>
             <a:endParaRPr lang="en-US"/>
           </a:p>
@@ -2074,7 +3474,7 @@
           <a:p>
             <a:fld id="{BDB340C8-6E77-45F4-B009-4185183E7707}" type="datetimeFigureOut">
               <a:rPr lang="en-US" smtClean="0"/>
-              <a:t>4/29/2019</a:t>
+              <a:t>5/27/2019</a:t>
             </a:fld>
             <a:endParaRPr lang="en-US"/>
           </a:p>
@@ -2385,7 +3785,7 @@
           <a:p>
             <a:fld id="{BDB340C8-6E77-45F4-B009-4185183E7707}" type="datetimeFigureOut">
               <a:rPr lang="en-US" smtClean="0"/>
-              <a:t>4/29/2019</a:t>
+              <a:t>5/27/2019</a:t>
             </a:fld>
             <a:endParaRPr lang="en-US"/>
           </a:p>
@@ -2673,7 +4073,7 @@
           <a:p>
             <a:fld id="{BDB340C8-6E77-45F4-B009-4185183E7707}" type="datetimeFigureOut">
               <a:rPr lang="en-US" smtClean="0"/>
-              <a:t>4/29/2019</a:t>
+              <a:t>5/27/2019</a:t>
             </a:fld>
             <a:endParaRPr lang="en-US"/>
           </a:p>
@@ -2914,7 +4314,7 @@
           <a:p>
             <a:fld id="{BDB340C8-6E77-45F4-B009-4185183E7707}" type="datetimeFigureOut">
               <a:rPr lang="en-US" smtClean="0"/>
-              <a:t>4/29/2019</a:t>
+              <a:t>5/27/2019</a:t>
             </a:fld>
             <a:endParaRPr lang="en-US"/>
           </a:p>
@@ -6372,7 +7772,1297 @@
 </p:sld>
 </file>
 
+<file path=ppt/slides/slide7.xml><?xml version="1.0" encoding="utf-8"?>
+<p:sld xmlns:a="http://schemas.openxmlformats.org/drawingml/2006/main" xmlns:r="http://schemas.openxmlformats.org/officeDocument/2006/relationships" xmlns:p="http://schemas.openxmlformats.org/presentationml/2006/main">
+  <p:cSld>
+    <p:spTree>
+      <p:nvGrpSpPr>
+        <p:cNvPr id="1" name=""/>
+        <p:cNvGrpSpPr/>
+        <p:nvPr/>
+      </p:nvGrpSpPr>
+      <p:grpSpPr>
+        <a:xfrm>
+          <a:off x="0" y="0"/>
+          <a:ext cx="0" cy="0"/>
+          <a:chOff x="0" y="0"/>
+          <a:chExt cx="0" cy="0"/>
+        </a:xfrm>
+      </p:grpSpPr>
+      <p:sp>
+        <p:nvSpPr>
+          <p:cNvPr id="4" name="Rectangle 3">
+            <a:extLst>
+              <a:ext uri="{FF2B5EF4-FFF2-40B4-BE49-F238E27FC236}">
+                <a16:creationId xmlns:a16="http://schemas.microsoft.com/office/drawing/2014/main" id="{DFA08EDF-D3D8-49AE-AE5F-2172EB61AB7B}"/>
+              </a:ext>
+            </a:extLst>
+          </p:cNvPr>
+          <p:cNvSpPr/>
+          <p:nvPr/>
+        </p:nvSpPr>
+        <p:spPr>
+          <a:xfrm>
+            <a:off x="3027285" y="128271"/>
+            <a:ext cx="7057748" cy="584775"/>
+          </a:xfrm>
+          <a:prstGeom prst="rect">
+            <a:avLst/>
+          </a:prstGeom>
+        </p:spPr>
+        <p:txBody>
+          <a:bodyPr wrap="square">
+            <a:spAutoFit/>
+          </a:bodyPr>
+          <a:lstStyle/>
+          <a:p>
+            <a:r>
+              <a:rPr lang="es-ES" sz="3200" dirty="0">
+                <a:latin typeface="Montserrat"/>
+              </a:rPr>
+              <a:t>Por qué debería estudiar </a:t>
+            </a:r>
+            <a:r>
+              <a:rPr lang="es-ES" sz="3200" dirty="0" err="1">
+                <a:latin typeface="Montserrat"/>
+              </a:rPr>
+              <a:t>Flutter</a:t>
+            </a:r>
+            <a:r>
+              <a:rPr lang="es-ES" sz="3200" dirty="0">
+                <a:latin typeface="Montserrat"/>
+              </a:rPr>
+              <a:t> </a:t>
+            </a:r>
+            <a:r>
+              <a:rPr lang="en-US" sz="3200" dirty="0">
+                <a:latin typeface="Montserrat"/>
+              </a:rPr>
+              <a:t>?</a:t>
+            </a:r>
+          </a:p>
+        </p:txBody>
+      </p:sp>
+      <p:sp>
+        <p:nvSpPr>
+          <p:cNvPr id="7" name="Rectangle 6">
+            <a:extLst>
+              <a:ext uri="{FF2B5EF4-FFF2-40B4-BE49-F238E27FC236}">
+                <a16:creationId xmlns:a16="http://schemas.microsoft.com/office/drawing/2014/main" id="{6734829F-E4B5-4C46-A5EF-ACC7095164AB}"/>
+              </a:ext>
+            </a:extLst>
+          </p:cNvPr>
+          <p:cNvSpPr/>
+          <p:nvPr/>
+        </p:nvSpPr>
+        <p:spPr>
+          <a:xfrm>
+            <a:off x="128724" y="873763"/>
+            <a:ext cx="11792505" cy="4401205"/>
+          </a:xfrm>
+          <a:prstGeom prst="rect">
+            <a:avLst/>
+          </a:prstGeom>
+        </p:spPr>
+        <p:txBody>
+          <a:bodyPr wrap="square">
+            <a:spAutoFit/>
+          </a:bodyPr>
+          <a:lstStyle/>
+          <a:p>
+            <a:pPr marL="457200" indent="-457200" algn="just">
+              <a:buFont typeface="Wingdings" panose="05000000000000000000" pitchFamily="2" charset="2"/>
+              <a:buChar char="§"/>
+            </a:pPr>
+            <a:r>
+              <a:rPr lang="es-US" sz="2800" dirty="0">
+                <a:solidFill>
+                  <a:srgbClr val="000000"/>
+                </a:solidFill>
+                <a:latin typeface="Open Sans"/>
+              </a:rPr>
+              <a:t>Utilizando un solo código base podemos obtener aplicaciones para      </a:t>
+            </a:r>
+            <a:r>
+              <a:rPr lang="en-US" sz="2800" dirty="0">
+                <a:solidFill>
+                  <a:srgbClr val="000000"/>
+                </a:solidFill>
+                <a:latin typeface="Open Sans"/>
+              </a:rPr>
+              <a:t>( Android, IOS, Web, Desktop ).</a:t>
+            </a:r>
+          </a:p>
+          <a:p>
+            <a:pPr marL="457200" indent="-457200" algn="just">
+              <a:buFont typeface="Wingdings" panose="05000000000000000000" pitchFamily="2" charset="2"/>
+              <a:buChar char="§"/>
+            </a:pPr>
+            <a:endParaRPr lang="en-US" sz="2800" dirty="0">
+              <a:solidFill>
+                <a:srgbClr val="000000"/>
+              </a:solidFill>
+              <a:latin typeface="Open Sans"/>
+            </a:endParaRPr>
+          </a:p>
+          <a:p>
+            <a:pPr marL="457200" indent="-457200" algn="just">
+              <a:buFont typeface="Wingdings" panose="05000000000000000000" pitchFamily="2" charset="2"/>
+              <a:buChar char="§"/>
+            </a:pPr>
+            <a:r>
+              <a:rPr lang="es-US" sz="2800" dirty="0">
+                <a:solidFill>
+                  <a:srgbClr val="000000"/>
+                </a:solidFill>
+                <a:latin typeface="Open Sans"/>
+              </a:rPr>
+              <a:t>Productividad</a:t>
+            </a:r>
+            <a:r>
+              <a:rPr lang="en-US" sz="2800" dirty="0">
+                <a:solidFill>
+                  <a:srgbClr val="000000"/>
+                </a:solidFill>
+                <a:latin typeface="Open Sans"/>
+              </a:rPr>
+              <a:t> ( </a:t>
+            </a:r>
+            <a:r>
+              <a:rPr lang="es-US" sz="2800" dirty="0">
+                <a:solidFill>
+                  <a:srgbClr val="000000"/>
+                </a:solidFill>
+                <a:latin typeface="Open Sans"/>
+              </a:rPr>
+              <a:t>carga</a:t>
+            </a:r>
+            <a:r>
+              <a:rPr lang="en-US" sz="2800" dirty="0">
+                <a:solidFill>
+                  <a:srgbClr val="000000"/>
+                </a:solidFill>
+                <a:latin typeface="Open Sans"/>
+              </a:rPr>
+              <a:t> y </a:t>
+            </a:r>
+            <a:r>
+              <a:rPr lang="es-US" sz="2800" dirty="0">
+                <a:solidFill>
+                  <a:srgbClr val="000000"/>
+                </a:solidFill>
+                <a:latin typeface="Open Sans"/>
+              </a:rPr>
+              <a:t>actualización</a:t>
+            </a:r>
+            <a:r>
+              <a:rPr lang="en-US" sz="2800" dirty="0">
+                <a:solidFill>
+                  <a:srgbClr val="000000"/>
+                </a:solidFill>
+                <a:latin typeface="Open Sans"/>
+              </a:rPr>
+              <a:t> </a:t>
+            </a:r>
+            <a:r>
+              <a:rPr lang="es-US" sz="2800" dirty="0">
+                <a:solidFill>
+                  <a:srgbClr val="000000"/>
+                </a:solidFill>
+                <a:latin typeface="Open Sans"/>
+              </a:rPr>
+              <a:t>rápida</a:t>
+            </a:r>
+            <a:r>
+              <a:rPr lang="en-US" sz="2800" dirty="0">
+                <a:solidFill>
+                  <a:srgbClr val="000000"/>
+                </a:solidFill>
+                <a:latin typeface="Open Sans"/>
+              </a:rPr>
+              <a:t> ).</a:t>
+            </a:r>
+          </a:p>
+          <a:p>
+            <a:pPr marL="457200" indent="-457200" algn="just">
+              <a:buFont typeface="Wingdings" panose="05000000000000000000" pitchFamily="2" charset="2"/>
+              <a:buChar char="§"/>
+            </a:pPr>
+            <a:endParaRPr lang="en-US" sz="2800" dirty="0">
+              <a:solidFill>
+                <a:srgbClr val="000000"/>
+              </a:solidFill>
+              <a:latin typeface="Open Sans"/>
+            </a:endParaRPr>
+          </a:p>
+          <a:p>
+            <a:pPr marL="457200" indent="-457200" algn="just">
+              <a:buFont typeface="Wingdings" panose="05000000000000000000" pitchFamily="2" charset="2"/>
+              <a:buChar char="§"/>
+            </a:pPr>
+            <a:r>
+              <a:rPr lang="es-US" sz="2800" dirty="0">
+                <a:solidFill>
+                  <a:srgbClr val="000000"/>
+                </a:solidFill>
+                <a:latin typeface="Open Sans"/>
+              </a:rPr>
+              <a:t>Dependencias</a:t>
+            </a:r>
+            <a:r>
+              <a:rPr lang="en-US" sz="2800" dirty="0">
+                <a:solidFill>
+                  <a:srgbClr val="000000"/>
+                </a:solidFill>
+                <a:latin typeface="Open Sans"/>
+              </a:rPr>
+              <a:t> de plugins y libs.</a:t>
+            </a:r>
+          </a:p>
+          <a:p>
+            <a:pPr marL="457200" indent="-457200" algn="just">
+              <a:buFont typeface="Wingdings" panose="05000000000000000000" pitchFamily="2" charset="2"/>
+              <a:buChar char="§"/>
+            </a:pPr>
+            <a:endParaRPr lang="en-US" sz="2800" dirty="0">
+              <a:solidFill>
+                <a:srgbClr val="000000"/>
+              </a:solidFill>
+              <a:latin typeface="Open Sans"/>
+            </a:endParaRPr>
+          </a:p>
+          <a:p>
+            <a:pPr marL="457200" indent="-457200" algn="just">
+              <a:buFont typeface="Wingdings" panose="05000000000000000000" pitchFamily="2" charset="2"/>
+              <a:buChar char="§"/>
+            </a:pPr>
+            <a:r>
+              <a:rPr lang="es-US" sz="2800" dirty="0">
+                <a:solidFill>
+                  <a:srgbClr val="000000"/>
+                </a:solidFill>
+                <a:latin typeface="Open Sans"/>
+              </a:rPr>
+              <a:t>Sistema de diseño simple y flexible.</a:t>
+            </a:r>
+          </a:p>
+          <a:p>
+            <a:pPr marL="457200" indent="-457200" algn="just">
+              <a:buFont typeface="Wingdings" panose="05000000000000000000" pitchFamily="2" charset="2"/>
+              <a:buChar char="§"/>
+            </a:pPr>
+            <a:endParaRPr lang="es-US" sz="2800" dirty="0">
+              <a:solidFill>
+                <a:srgbClr val="000000"/>
+              </a:solidFill>
+              <a:latin typeface="Open Sans"/>
+            </a:endParaRPr>
+          </a:p>
+          <a:p>
+            <a:pPr marL="457200" indent="-457200" algn="just">
+              <a:buFont typeface="Wingdings" panose="05000000000000000000" pitchFamily="2" charset="2"/>
+              <a:buChar char="§"/>
+            </a:pPr>
+            <a:r>
+              <a:rPr lang="es-US" sz="2800" dirty="0">
+                <a:solidFill>
+                  <a:srgbClr val="000000"/>
+                </a:solidFill>
+                <a:latin typeface="Open Sans"/>
+              </a:rPr>
+              <a:t>Acceso al código fuente.</a:t>
+            </a:r>
+            <a:endParaRPr lang="en-US" sz="2800" dirty="0">
+              <a:solidFill>
+                <a:srgbClr val="000000"/>
+              </a:solidFill>
+              <a:latin typeface="Open Sans"/>
+            </a:endParaRPr>
+          </a:p>
+        </p:txBody>
+      </p:sp>
+    </p:spTree>
+    <p:extLst>
+      <p:ext uri="{BB962C8B-B14F-4D97-AF65-F5344CB8AC3E}">
+        <p14:creationId xmlns:p14="http://schemas.microsoft.com/office/powerpoint/2010/main" val="3220284322"/>
+      </p:ext>
+    </p:extLst>
+  </p:cSld>
+  <p:clrMapOvr>
+    <a:masterClrMapping/>
+  </p:clrMapOvr>
+  <p:timing>
+    <p:tnLst>
+      <p:par>
+        <p:cTn id="1" dur="indefinite" restart="never" nodeType="tmRoot">
+          <p:childTnLst>
+            <p:seq concurrent="1" nextAc="seek">
+              <p:cTn id="2" dur="indefinite" nodeType="mainSeq">
+                <p:childTnLst>
+                  <p:par>
+                    <p:cTn id="3" fill="hold">
+                      <p:stCondLst>
+                        <p:cond delay="indefinite"/>
+                      </p:stCondLst>
+                      <p:childTnLst>
+                        <p:par>
+                          <p:cTn id="4" fill="hold">
+                            <p:stCondLst>
+                              <p:cond delay="0"/>
+                            </p:stCondLst>
+                            <p:childTnLst>
+                              <p:par>
+                                <p:cTn id="5" presetID="1" presetClass="entr" presetSubtype="0" fill="hold" nodeType="clickEffect">
+                                  <p:stCondLst>
+                                    <p:cond delay="0"/>
+                                  </p:stCondLst>
+                                  <p:childTnLst>
+                                    <p:set>
+                                      <p:cBhvr>
+                                        <p:cTn id="6" dur="1" fill="hold">
+                                          <p:stCondLst>
+                                            <p:cond delay="0"/>
+                                          </p:stCondLst>
+                                        </p:cTn>
+                                        <p:tgtEl>
+                                          <p:spTgt spid="7">
+                                            <p:txEl>
+                                              <p:pRg st="0" end="0"/>
+                                            </p:txEl>
+                                          </p:spTgt>
+                                        </p:tgtEl>
+                                        <p:attrNameLst>
+                                          <p:attrName>style.visibility</p:attrName>
+                                        </p:attrNameLst>
+                                      </p:cBhvr>
+                                      <p:to>
+                                        <p:strVal val="visible"/>
+                                      </p:to>
+                                    </p:set>
+                                  </p:childTnLst>
+                                </p:cTn>
+                              </p:par>
+                            </p:childTnLst>
+                          </p:cTn>
+                        </p:par>
+                      </p:childTnLst>
+                    </p:cTn>
+                  </p:par>
+                  <p:par>
+                    <p:cTn id="7" fill="hold">
+                      <p:stCondLst>
+                        <p:cond delay="indefinite"/>
+                      </p:stCondLst>
+                      <p:childTnLst>
+                        <p:par>
+                          <p:cTn id="8" fill="hold">
+                            <p:stCondLst>
+                              <p:cond delay="0"/>
+                            </p:stCondLst>
+                            <p:childTnLst>
+                              <p:par>
+                                <p:cTn id="9" presetID="1" presetClass="entr" presetSubtype="0" fill="hold" nodeType="clickEffect">
+                                  <p:stCondLst>
+                                    <p:cond delay="0"/>
+                                  </p:stCondLst>
+                                  <p:childTnLst>
+                                    <p:set>
+                                      <p:cBhvr>
+                                        <p:cTn id="10" dur="1" fill="hold">
+                                          <p:stCondLst>
+                                            <p:cond delay="0"/>
+                                          </p:stCondLst>
+                                        </p:cTn>
+                                        <p:tgtEl>
+                                          <p:spTgt spid="7">
+                                            <p:txEl>
+                                              <p:pRg st="2" end="2"/>
+                                            </p:txEl>
+                                          </p:spTgt>
+                                        </p:tgtEl>
+                                        <p:attrNameLst>
+                                          <p:attrName>style.visibility</p:attrName>
+                                        </p:attrNameLst>
+                                      </p:cBhvr>
+                                      <p:to>
+                                        <p:strVal val="visible"/>
+                                      </p:to>
+                                    </p:set>
+                                  </p:childTnLst>
+                                </p:cTn>
+                              </p:par>
+                            </p:childTnLst>
+                          </p:cTn>
+                        </p:par>
+                      </p:childTnLst>
+                    </p:cTn>
+                  </p:par>
+                  <p:par>
+                    <p:cTn id="11" fill="hold">
+                      <p:stCondLst>
+                        <p:cond delay="indefinite"/>
+                      </p:stCondLst>
+                      <p:childTnLst>
+                        <p:par>
+                          <p:cTn id="12" fill="hold">
+                            <p:stCondLst>
+                              <p:cond delay="0"/>
+                            </p:stCondLst>
+                            <p:childTnLst>
+                              <p:par>
+                                <p:cTn id="13" presetID="1" presetClass="entr" presetSubtype="0" fill="hold" nodeType="clickEffect">
+                                  <p:stCondLst>
+                                    <p:cond delay="0"/>
+                                  </p:stCondLst>
+                                  <p:childTnLst>
+                                    <p:set>
+                                      <p:cBhvr>
+                                        <p:cTn id="14" dur="1" fill="hold">
+                                          <p:stCondLst>
+                                            <p:cond delay="0"/>
+                                          </p:stCondLst>
+                                        </p:cTn>
+                                        <p:tgtEl>
+                                          <p:spTgt spid="7">
+                                            <p:txEl>
+                                              <p:pRg st="4" end="4"/>
+                                            </p:txEl>
+                                          </p:spTgt>
+                                        </p:tgtEl>
+                                        <p:attrNameLst>
+                                          <p:attrName>style.visibility</p:attrName>
+                                        </p:attrNameLst>
+                                      </p:cBhvr>
+                                      <p:to>
+                                        <p:strVal val="visible"/>
+                                      </p:to>
+                                    </p:set>
+                                  </p:childTnLst>
+                                </p:cTn>
+                              </p:par>
+                            </p:childTnLst>
+                          </p:cTn>
+                        </p:par>
+                      </p:childTnLst>
+                    </p:cTn>
+                  </p:par>
+                  <p:par>
+                    <p:cTn id="15" fill="hold">
+                      <p:stCondLst>
+                        <p:cond delay="indefinite"/>
+                      </p:stCondLst>
+                      <p:childTnLst>
+                        <p:par>
+                          <p:cTn id="16" fill="hold">
+                            <p:stCondLst>
+                              <p:cond delay="0"/>
+                            </p:stCondLst>
+                            <p:childTnLst>
+                              <p:par>
+                                <p:cTn id="17" presetID="1" presetClass="entr" presetSubtype="0" fill="hold" nodeType="clickEffect">
+                                  <p:stCondLst>
+                                    <p:cond delay="0"/>
+                                  </p:stCondLst>
+                                  <p:childTnLst>
+                                    <p:set>
+                                      <p:cBhvr>
+                                        <p:cTn id="18" dur="1" fill="hold">
+                                          <p:stCondLst>
+                                            <p:cond delay="0"/>
+                                          </p:stCondLst>
+                                        </p:cTn>
+                                        <p:tgtEl>
+                                          <p:spTgt spid="7">
+                                            <p:txEl>
+                                              <p:pRg st="6" end="6"/>
+                                            </p:txEl>
+                                          </p:spTgt>
+                                        </p:tgtEl>
+                                        <p:attrNameLst>
+                                          <p:attrName>style.visibility</p:attrName>
+                                        </p:attrNameLst>
+                                      </p:cBhvr>
+                                      <p:to>
+                                        <p:strVal val="visible"/>
+                                      </p:to>
+                                    </p:set>
+                                  </p:childTnLst>
+                                </p:cTn>
+                              </p:par>
+                            </p:childTnLst>
+                          </p:cTn>
+                        </p:par>
+                      </p:childTnLst>
+                    </p:cTn>
+                  </p:par>
+                  <p:par>
+                    <p:cTn id="19" fill="hold">
+                      <p:stCondLst>
+                        <p:cond delay="indefinite"/>
+                      </p:stCondLst>
+                      <p:childTnLst>
+                        <p:par>
+                          <p:cTn id="20" fill="hold">
+                            <p:stCondLst>
+                              <p:cond delay="0"/>
+                            </p:stCondLst>
+                            <p:childTnLst>
+                              <p:par>
+                                <p:cTn id="21" presetID="1" presetClass="entr" presetSubtype="0" fill="hold" nodeType="clickEffect">
+                                  <p:stCondLst>
+                                    <p:cond delay="0"/>
+                                  </p:stCondLst>
+                                  <p:childTnLst>
+                                    <p:set>
+                                      <p:cBhvr>
+                                        <p:cTn id="22" dur="1" fill="hold">
+                                          <p:stCondLst>
+                                            <p:cond delay="0"/>
+                                          </p:stCondLst>
+                                        </p:cTn>
+                                        <p:tgtEl>
+                                          <p:spTgt spid="7">
+                                            <p:txEl>
+                                              <p:pRg st="8" end="8"/>
+                                            </p:txEl>
+                                          </p:spTgt>
+                                        </p:tgtEl>
+                                        <p:attrNameLst>
+                                          <p:attrName>style.visibility</p:attrName>
+                                        </p:attrNameLst>
+                                      </p:cBhvr>
+                                      <p:to>
+                                        <p:strVal val="visible"/>
+                                      </p:to>
+                                    </p:set>
+                                  </p:childTnLst>
+                                </p:cTn>
+                              </p:par>
+                            </p:childTnLst>
+                          </p:cTn>
+                        </p:par>
+                      </p:childTnLst>
+                    </p:cTn>
+                  </p:par>
+                </p:childTnLst>
+              </p:cTn>
+              <p:prevCondLst>
+                <p:cond evt="onPrev" delay="0">
+                  <p:tgtEl>
+                    <p:sldTgt/>
+                  </p:tgtEl>
+                </p:cond>
+              </p:prevCondLst>
+              <p:nextCondLst>
+                <p:cond evt="onNext" delay="0">
+                  <p:tgtEl>
+                    <p:sldTgt/>
+                  </p:tgtEl>
+                </p:cond>
+              </p:nextCondLst>
+            </p:seq>
+          </p:childTnLst>
+        </p:cTn>
+      </p:par>
+    </p:tnLst>
+  </p:timing>
+</p:sld>
+</file>
+
+<file path=ppt/slides/slide8.xml><?xml version="1.0" encoding="utf-8"?>
+<p:sld xmlns:a="http://schemas.openxmlformats.org/drawingml/2006/main" xmlns:r="http://schemas.openxmlformats.org/officeDocument/2006/relationships" xmlns:p="http://schemas.openxmlformats.org/presentationml/2006/main">
+  <p:cSld>
+    <p:spTree>
+      <p:nvGrpSpPr>
+        <p:cNvPr id="1" name=""/>
+        <p:cNvGrpSpPr/>
+        <p:nvPr/>
+      </p:nvGrpSpPr>
+      <p:grpSpPr>
+        <a:xfrm>
+          <a:off x="0" y="0"/>
+          <a:ext cx="0" cy="0"/>
+          <a:chOff x="0" y="0"/>
+          <a:chExt cx="0" cy="0"/>
+        </a:xfrm>
+      </p:grpSpPr>
+      <p:sp>
+        <p:nvSpPr>
+          <p:cNvPr id="4" name="Rectangle 3">
+            <a:extLst>
+              <a:ext uri="{FF2B5EF4-FFF2-40B4-BE49-F238E27FC236}">
+                <a16:creationId xmlns:a16="http://schemas.microsoft.com/office/drawing/2014/main" id="{DFA08EDF-D3D8-49AE-AE5F-2172EB61AB7B}"/>
+              </a:ext>
+            </a:extLst>
+          </p:cNvPr>
+          <p:cNvSpPr/>
+          <p:nvPr/>
+        </p:nvSpPr>
+        <p:spPr>
+          <a:xfrm>
+            <a:off x="3027285" y="128271"/>
+            <a:ext cx="7057748" cy="584775"/>
+          </a:xfrm>
+          <a:prstGeom prst="rect">
+            <a:avLst/>
+          </a:prstGeom>
+        </p:spPr>
+        <p:txBody>
+          <a:bodyPr wrap="square">
+            <a:spAutoFit/>
+          </a:bodyPr>
+          <a:lstStyle/>
+          <a:p>
+            <a:pPr algn="ctr"/>
+            <a:r>
+              <a:rPr lang="es-US" sz="3200" dirty="0">
+                <a:latin typeface="Montserrat"/>
+              </a:rPr>
+              <a:t>Curso de </a:t>
+            </a:r>
+            <a:r>
+              <a:rPr lang="es-US" sz="3200" dirty="0" err="1">
+                <a:latin typeface="Montserrat"/>
+              </a:rPr>
+              <a:t>Flutter</a:t>
+            </a:r>
+            <a:r>
+              <a:rPr lang="es-US" sz="3200" dirty="0">
+                <a:latin typeface="Montserrat"/>
+              </a:rPr>
+              <a:t> </a:t>
+            </a:r>
+            <a:r>
+              <a:rPr lang="en-US" sz="3200" dirty="0">
+                <a:latin typeface="Montserrat"/>
+              </a:rPr>
+              <a:t>| </a:t>
+            </a:r>
+            <a:r>
+              <a:rPr lang="en-US" sz="3200" dirty="0" err="1">
+                <a:latin typeface="Montserrat"/>
+              </a:rPr>
+              <a:t>clase</a:t>
+            </a:r>
+            <a:r>
+              <a:rPr lang="en-US" sz="3200">
+                <a:latin typeface="Montserrat"/>
+              </a:rPr>
+              <a:t> #2</a:t>
+            </a:r>
+            <a:endParaRPr lang="es-US" sz="3200" dirty="0">
+              <a:latin typeface="Montserrat"/>
+            </a:endParaRPr>
+          </a:p>
+        </p:txBody>
+      </p:sp>
+      <p:sp>
+        <p:nvSpPr>
+          <p:cNvPr id="7" name="Rectangle 6">
+            <a:extLst>
+              <a:ext uri="{FF2B5EF4-FFF2-40B4-BE49-F238E27FC236}">
+                <a16:creationId xmlns:a16="http://schemas.microsoft.com/office/drawing/2014/main" id="{6734829F-E4B5-4C46-A5EF-ACC7095164AB}"/>
+              </a:ext>
+            </a:extLst>
+          </p:cNvPr>
+          <p:cNvSpPr/>
+          <p:nvPr/>
+        </p:nvSpPr>
+        <p:spPr>
+          <a:xfrm>
+            <a:off x="128724" y="873763"/>
+            <a:ext cx="11792505" cy="1815882"/>
+          </a:xfrm>
+          <a:prstGeom prst="rect">
+            <a:avLst/>
+          </a:prstGeom>
+        </p:spPr>
+        <p:txBody>
+          <a:bodyPr wrap="square">
+            <a:spAutoFit/>
+          </a:bodyPr>
+          <a:lstStyle/>
+          <a:p>
+            <a:pPr marL="457200" indent="-457200" algn="just">
+              <a:buFont typeface="Wingdings" panose="05000000000000000000" pitchFamily="2" charset="2"/>
+              <a:buChar char="§"/>
+            </a:pPr>
+            <a:r>
+              <a:rPr lang="es-US" sz="2800" dirty="0">
+                <a:solidFill>
+                  <a:srgbClr val="000000"/>
+                </a:solidFill>
+                <a:latin typeface="Open Sans"/>
+              </a:rPr>
+              <a:t>Crear nuestra primera app</a:t>
+            </a:r>
+            <a:r>
+              <a:rPr lang="en-US" sz="2800" dirty="0">
+                <a:solidFill>
+                  <a:srgbClr val="000000"/>
+                </a:solidFill>
+                <a:latin typeface="Open Sans"/>
+              </a:rPr>
+              <a:t>.</a:t>
+            </a:r>
+          </a:p>
+          <a:p>
+            <a:pPr marL="457200" indent="-457200" algn="just">
+              <a:buFont typeface="Wingdings" panose="05000000000000000000" pitchFamily="2" charset="2"/>
+              <a:buChar char="§"/>
+            </a:pPr>
+            <a:r>
+              <a:rPr lang="es-US" sz="2800" dirty="0">
+                <a:solidFill>
+                  <a:srgbClr val="000000"/>
+                </a:solidFill>
+                <a:latin typeface="Open Sans"/>
+              </a:rPr>
+              <a:t>Estructura</a:t>
+            </a:r>
+            <a:r>
+              <a:rPr lang="en-US" sz="2800" dirty="0">
+                <a:solidFill>
+                  <a:srgbClr val="000000"/>
+                </a:solidFill>
+                <a:latin typeface="Open Sans"/>
+              </a:rPr>
+              <a:t> de </a:t>
+            </a:r>
+            <a:r>
+              <a:rPr lang="es-US" sz="2800" dirty="0">
+                <a:solidFill>
+                  <a:srgbClr val="000000"/>
+                </a:solidFill>
+                <a:latin typeface="Open Sans"/>
+              </a:rPr>
+              <a:t>carpetas</a:t>
+            </a:r>
+          </a:p>
+          <a:p>
+            <a:pPr marL="457200" indent="-457200" algn="just">
+              <a:buFont typeface="Wingdings" panose="05000000000000000000" pitchFamily="2" charset="2"/>
+              <a:buChar char="§"/>
+            </a:pPr>
+            <a:r>
+              <a:rPr lang="es-US" sz="2800" dirty="0" err="1">
+                <a:solidFill>
+                  <a:srgbClr val="000000"/>
+                </a:solidFill>
+                <a:latin typeface="Open Sans"/>
+              </a:rPr>
+              <a:t>Scaffold</a:t>
+            </a:r>
+            <a:r>
+              <a:rPr lang="es-US" sz="2800" dirty="0">
+                <a:solidFill>
+                  <a:srgbClr val="000000"/>
+                </a:solidFill>
+                <a:latin typeface="Open Sans"/>
+              </a:rPr>
+              <a:t> widget</a:t>
+            </a:r>
+          </a:p>
+          <a:p>
+            <a:pPr marL="457200" indent="-457200" algn="just">
+              <a:buFont typeface="Wingdings" panose="05000000000000000000" pitchFamily="2" charset="2"/>
+              <a:buChar char="§"/>
+            </a:pPr>
+            <a:endParaRPr lang="en-US" sz="2800" dirty="0">
+              <a:solidFill>
+                <a:srgbClr val="000000"/>
+              </a:solidFill>
+              <a:latin typeface="Open Sans"/>
+            </a:endParaRPr>
+          </a:p>
+        </p:txBody>
+      </p:sp>
+    </p:spTree>
+    <p:extLst>
+      <p:ext uri="{BB962C8B-B14F-4D97-AF65-F5344CB8AC3E}">
+        <p14:creationId xmlns:p14="http://schemas.microsoft.com/office/powerpoint/2010/main" val="2757187434"/>
+      </p:ext>
+    </p:extLst>
+  </p:cSld>
+  <p:clrMapOvr>
+    <a:masterClrMapping/>
+  </p:clrMapOvr>
+  <p:timing>
+    <p:tnLst>
+      <p:par>
+        <p:cTn id="1" dur="indefinite" restart="never" nodeType="tmRoot">
+          <p:childTnLst>
+            <p:seq concurrent="1" nextAc="seek">
+              <p:cTn id="2" dur="indefinite" nodeType="mainSeq">
+                <p:childTnLst>
+                  <p:par>
+                    <p:cTn id="3" fill="hold">
+                      <p:stCondLst>
+                        <p:cond delay="indefinite"/>
+                      </p:stCondLst>
+                      <p:childTnLst>
+                        <p:par>
+                          <p:cTn id="4" fill="hold">
+                            <p:stCondLst>
+                              <p:cond delay="0"/>
+                            </p:stCondLst>
+                            <p:childTnLst>
+                              <p:par>
+                                <p:cTn id="5" presetID="1" presetClass="entr" presetSubtype="0" fill="hold" nodeType="clickEffect">
+                                  <p:stCondLst>
+                                    <p:cond delay="0"/>
+                                  </p:stCondLst>
+                                  <p:childTnLst>
+                                    <p:set>
+                                      <p:cBhvr>
+                                        <p:cTn id="6" dur="1" fill="hold">
+                                          <p:stCondLst>
+                                            <p:cond delay="0"/>
+                                          </p:stCondLst>
+                                        </p:cTn>
+                                        <p:tgtEl>
+                                          <p:spTgt spid="7">
+                                            <p:txEl>
+                                              <p:pRg st="0" end="0"/>
+                                            </p:txEl>
+                                          </p:spTgt>
+                                        </p:tgtEl>
+                                        <p:attrNameLst>
+                                          <p:attrName>style.visibility</p:attrName>
+                                        </p:attrNameLst>
+                                      </p:cBhvr>
+                                      <p:to>
+                                        <p:strVal val="visible"/>
+                                      </p:to>
+                                    </p:set>
+                                  </p:childTnLst>
+                                </p:cTn>
+                              </p:par>
+                            </p:childTnLst>
+                          </p:cTn>
+                        </p:par>
+                      </p:childTnLst>
+                    </p:cTn>
+                  </p:par>
+                  <p:par>
+                    <p:cTn id="7" fill="hold">
+                      <p:stCondLst>
+                        <p:cond delay="indefinite"/>
+                      </p:stCondLst>
+                      <p:childTnLst>
+                        <p:par>
+                          <p:cTn id="8" fill="hold">
+                            <p:stCondLst>
+                              <p:cond delay="0"/>
+                            </p:stCondLst>
+                            <p:childTnLst>
+                              <p:par>
+                                <p:cTn id="9" presetID="1" presetClass="entr" presetSubtype="0" fill="hold" nodeType="clickEffect">
+                                  <p:stCondLst>
+                                    <p:cond delay="0"/>
+                                  </p:stCondLst>
+                                  <p:childTnLst>
+                                    <p:set>
+                                      <p:cBhvr>
+                                        <p:cTn id="10" dur="1" fill="hold">
+                                          <p:stCondLst>
+                                            <p:cond delay="0"/>
+                                          </p:stCondLst>
+                                        </p:cTn>
+                                        <p:tgtEl>
+                                          <p:spTgt spid="7">
+                                            <p:txEl>
+                                              <p:pRg st="1" end="1"/>
+                                            </p:txEl>
+                                          </p:spTgt>
+                                        </p:tgtEl>
+                                        <p:attrNameLst>
+                                          <p:attrName>style.visibility</p:attrName>
+                                        </p:attrNameLst>
+                                      </p:cBhvr>
+                                      <p:to>
+                                        <p:strVal val="visible"/>
+                                      </p:to>
+                                    </p:set>
+                                  </p:childTnLst>
+                                </p:cTn>
+                              </p:par>
+                            </p:childTnLst>
+                          </p:cTn>
+                        </p:par>
+                      </p:childTnLst>
+                    </p:cTn>
+                  </p:par>
+                  <p:par>
+                    <p:cTn id="11" fill="hold">
+                      <p:stCondLst>
+                        <p:cond delay="indefinite"/>
+                      </p:stCondLst>
+                      <p:childTnLst>
+                        <p:par>
+                          <p:cTn id="12" fill="hold">
+                            <p:stCondLst>
+                              <p:cond delay="0"/>
+                            </p:stCondLst>
+                            <p:childTnLst>
+                              <p:par>
+                                <p:cTn id="13" presetID="1" presetClass="entr" presetSubtype="0" fill="hold" nodeType="clickEffect">
+                                  <p:stCondLst>
+                                    <p:cond delay="0"/>
+                                  </p:stCondLst>
+                                  <p:childTnLst>
+                                    <p:set>
+                                      <p:cBhvr>
+                                        <p:cTn id="14" dur="1" fill="hold">
+                                          <p:stCondLst>
+                                            <p:cond delay="0"/>
+                                          </p:stCondLst>
+                                        </p:cTn>
+                                        <p:tgtEl>
+                                          <p:spTgt spid="7">
+                                            <p:txEl>
+                                              <p:pRg st="2" end="2"/>
+                                            </p:txEl>
+                                          </p:spTgt>
+                                        </p:tgtEl>
+                                        <p:attrNameLst>
+                                          <p:attrName>style.visibility</p:attrName>
+                                        </p:attrNameLst>
+                                      </p:cBhvr>
+                                      <p:to>
+                                        <p:strVal val="visible"/>
+                                      </p:to>
+                                    </p:set>
+                                  </p:childTnLst>
+                                </p:cTn>
+                              </p:par>
+                            </p:childTnLst>
+                          </p:cTn>
+                        </p:par>
+                      </p:childTnLst>
+                    </p:cTn>
+                  </p:par>
+                </p:childTnLst>
+              </p:cTn>
+              <p:prevCondLst>
+                <p:cond evt="onPrev" delay="0">
+                  <p:tgtEl>
+                    <p:sldTgt/>
+                  </p:tgtEl>
+                </p:cond>
+              </p:prevCondLst>
+              <p:nextCondLst>
+                <p:cond evt="onNext" delay="0">
+                  <p:tgtEl>
+                    <p:sldTgt/>
+                  </p:tgtEl>
+                </p:cond>
+              </p:nextCondLst>
+            </p:seq>
+          </p:childTnLst>
+        </p:cTn>
+      </p:par>
+    </p:tnLst>
+  </p:timing>
+</p:sld>
+</file>
+
 <file path=ppt/theme/theme1.xml><?xml version="1.0" encoding="utf-8"?>
+<a:theme xmlns:a="http://schemas.openxmlformats.org/drawingml/2006/main" name="Office Theme">
+  <a:themeElements>
+    <a:clrScheme name="Office">
+      <a:dk1>
+        <a:sysClr val="windowText" lastClr="000000"/>
+      </a:dk1>
+      <a:lt1>
+        <a:sysClr val="window" lastClr="FFFFFF"/>
+      </a:lt1>
+      <a:dk2>
+        <a:srgbClr val="44546A"/>
+      </a:dk2>
+      <a:lt2>
+        <a:srgbClr val="E7E6E6"/>
+      </a:lt2>
+      <a:accent1>
+        <a:srgbClr val="4472C4"/>
+      </a:accent1>
+      <a:accent2>
+        <a:srgbClr val="ED7D31"/>
+      </a:accent2>
+      <a:accent3>
+        <a:srgbClr val="A5A5A5"/>
+      </a:accent3>
+      <a:accent4>
+        <a:srgbClr val="FFC000"/>
+      </a:accent4>
+      <a:accent5>
+        <a:srgbClr val="5B9BD5"/>
+      </a:accent5>
+      <a:accent6>
+        <a:srgbClr val="70AD47"/>
+      </a:accent6>
+      <a:hlink>
+        <a:srgbClr val="0563C1"/>
+      </a:hlink>
+      <a:folHlink>
+        <a:srgbClr val="954F72"/>
+      </a:folHlink>
+    </a:clrScheme>
+    <a:fontScheme name="Office">
+      <a:majorFont>
+        <a:latin typeface="Calibri Light" panose="020F0302020204030204"/>
+        <a:ea typeface=""/>
+        <a:cs typeface=""/>
+        <a:font script="Jpan" typeface="游ゴシック Light"/>
+        <a:font script="Hang" typeface="맑은 고딕"/>
+        <a:font script="Hans" typeface="等线 Light"/>
+        <a:font script="Hant" typeface="新細明體"/>
+        <a:font script="Arab" typeface="Times New Roman"/>
+        <a:font script="Hebr" typeface="Times New Roman"/>
+        <a:font script="Thai" typeface="Angsana New"/>
+        <a:font script="Ethi" typeface="Nyala"/>
+        <a:font script="Beng" typeface="Vrinda"/>
+        <a:font script="Gujr" typeface="Shruti"/>
+        <a:font script="Khmr" typeface="MoolBoran"/>
+        <a:font script="Knda" typeface="Tunga"/>
+        <a:font script="Guru" typeface="Raavi"/>
+        <a:font script="Cans" typeface="Euphemia"/>
+        <a:font script="Cher" typeface="Plantagenet Cherokee"/>
+        <a:font script="Yiii" typeface="Microsoft Yi Baiti"/>
+        <a:font script="Tibt" typeface="Microsoft Himalaya"/>
+        <a:font script="Thaa" typeface="MV Boli"/>
+        <a:font script="Deva" typeface="Mangal"/>
+        <a:font script="Telu" typeface="Gautami"/>
+        <a:font script="Taml" typeface="Latha"/>
+        <a:font script="Syrc" typeface="Estrangelo Edessa"/>
+        <a:font script="Orya" typeface="Kalinga"/>
+        <a:font script="Mlym" typeface="Kartika"/>
+        <a:font script="Laoo" typeface="DokChampa"/>
+        <a:font script="Sinh" typeface="Iskoola Pota"/>
+        <a:font script="Mong" typeface="Mongolian Baiti"/>
+        <a:font script="Viet" typeface="Times New Roman"/>
+        <a:font script="Uigh" typeface="Microsoft Uighur"/>
+        <a:font script="Geor" typeface="Sylfaen"/>
+        <a:font script="Armn" typeface="Arial"/>
+        <a:font script="Bugi" typeface="Leelawadee UI"/>
+        <a:font script="Bopo" typeface="Microsoft JhengHei"/>
+        <a:font script="Java" typeface="Javanese Text"/>
+        <a:font script="Lisu" typeface="Segoe UI"/>
+        <a:font script="Mymr" typeface="Myanmar Text"/>
+        <a:font script="Nkoo" typeface="Ebrima"/>
+        <a:font script="Olck" typeface="Nirmala UI"/>
+        <a:font script="Osma" typeface="Ebrima"/>
+        <a:font script="Phag" typeface="Phagspa"/>
+        <a:font script="Syrn" typeface="Estrangelo Edessa"/>
+        <a:font script="Syrj" typeface="Estrangelo Edessa"/>
+        <a:font script="Syre" typeface="Estrangelo Edessa"/>
+        <a:font script="Sora" typeface="Nirmala UI"/>
+        <a:font script="Tale" typeface="Microsoft Tai Le"/>
+        <a:font script="Talu" typeface="Microsoft New Tai Lue"/>
+        <a:font script="Tfng" typeface="Ebrima"/>
+      </a:majorFont>
+      <a:minorFont>
+        <a:latin typeface="Calibri" panose="020F0502020204030204"/>
+        <a:ea typeface=""/>
+        <a:cs typeface=""/>
+        <a:font script="Jpan" typeface="游ゴシック"/>
+        <a:font script="Hang" typeface="맑은 고딕"/>
+        <a:font script="Hans" typeface="等线"/>
+        <a:font script="Hant" typeface="新細明體"/>
+        <a:font script="Arab" typeface="Arial"/>
+        <a:font script="Hebr" typeface="Arial"/>
+        <a:font script="Thai" typeface="Cordia New"/>
+        <a:font script="Ethi" typeface="Nyala"/>
+        <a:font script="Beng" typeface="Vrinda"/>
+        <a:font script="Gujr" typeface="Shruti"/>
+        <a:font script="Khmr" typeface="DaunPenh"/>
+        <a:font script="Knda" typeface="Tunga"/>
+        <a:font script="Guru" typeface="Raavi"/>
+        <a:font script="Cans" typeface="Euphemia"/>
+        <a:font script="Cher" typeface="Plantagenet Cherokee"/>
+        <a:font script="Yiii" typeface="Microsoft Yi Baiti"/>
+        <a:font script="Tibt" typeface="Microsoft Himalaya"/>
+        <a:font script="Thaa" typeface="MV Boli"/>
+        <a:font script="Deva" typeface="Mangal"/>
+        <a:font script="Telu" typeface="Gautami"/>
+        <a:font script="Taml" typeface="Latha"/>
+        <a:font script="Syrc" typeface="Estrangelo Edessa"/>
+        <a:font script="Orya" typeface="Kalinga"/>
+        <a:font script="Mlym" typeface="Kartika"/>
+        <a:font script="Laoo" typeface="DokChampa"/>
+        <a:font script="Sinh" typeface="Iskoola Pota"/>
+        <a:font script="Mong" typeface="Mongolian Baiti"/>
+        <a:font script="Viet" typeface="Arial"/>
+        <a:font script="Uigh" typeface="Microsoft Uighur"/>
+        <a:font script="Geor" typeface="Sylfaen"/>
+        <a:font script="Armn" typeface="Arial"/>
+        <a:font script="Bugi" typeface="Leelawadee UI"/>
+        <a:font script="Bopo" typeface="Microsoft JhengHei"/>
+        <a:font script="Java" typeface="Javanese Text"/>
+        <a:font script="Lisu" typeface="Segoe UI"/>
+        <a:font script="Mymr" typeface="Myanmar Text"/>
+        <a:font script="Nkoo" typeface="Ebrima"/>
+        <a:font script="Olck" typeface="Nirmala UI"/>
+        <a:font script="Osma" typeface="Ebrima"/>
+        <a:font script="Phag" typeface="Phagspa"/>
+        <a:font script="Syrn" typeface="Estrangelo Edessa"/>
+        <a:font script="Syrj" typeface="Estrangelo Edessa"/>
+        <a:font script="Syre" typeface="Estrangelo Edessa"/>
+        <a:font script="Sora" typeface="Nirmala UI"/>
+        <a:font script="Tale" typeface="Microsoft Tai Le"/>
+        <a:font script="Talu" typeface="Microsoft New Tai Lue"/>
+        <a:font script="Tfng" typeface="Ebrima"/>
+      </a:minorFont>
+    </a:fontScheme>
+    <a:fmtScheme name="Office">
+      <a:fillStyleLst>
+        <a:solidFill>
+          <a:schemeClr val="phClr"/>
+        </a:solidFill>
+        <a:gradFill rotWithShape="1">
+          <a:gsLst>
+            <a:gs pos="0">
+              <a:schemeClr val="phClr">
+                <a:lumMod val="110000"/>
+                <a:satMod val="105000"/>
+                <a:tint val="67000"/>
+              </a:schemeClr>
+            </a:gs>
+            <a:gs pos="50000">
+              <a:schemeClr val="phClr">
+                <a:lumMod val="105000"/>
+                <a:satMod val="103000"/>
+                <a:tint val="73000"/>
+              </a:schemeClr>
+            </a:gs>
+            <a:gs pos="100000">
+              <a:schemeClr val="phClr">
+                <a:lumMod val="105000"/>
+                <a:satMod val="109000"/>
+                <a:tint val="81000"/>
+              </a:schemeClr>
+            </a:gs>
+          </a:gsLst>
+          <a:lin ang="5400000" scaled="0"/>
+        </a:gradFill>
+        <a:gradFill rotWithShape="1">
+          <a:gsLst>
+            <a:gs pos="0">
+              <a:schemeClr val="phClr">
+                <a:satMod val="103000"/>
+                <a:lumMod val="102000"/>
+                <a:tint val="94000"/>
+              </a:schemeClr>
+            </a:gs>
+            <a:gs pos="50000">
+              <a:schemeClr val="phClr">
+                <a:satMod val="110000"/>
+                <a:lumMod val="100000"/>
+                <a:shade val="100000"/>
+              </a:schemeClr>
+            </a:gs>
+            <a:gs pos="100000">
+              <a:schemeClr val="phClr">
+                <a:lumMod val="99000"/>
+                <a:satMod val="120000"/>
+                <a:shade val="78000"/>
+              </a:schemeClr>
+            </a:gs>
+          </a:gsLst>
+          <a:lin ang="5400000" scaled="0"/>
+        </a:gradFill>
+      </a:fillStyleLst>
+      <a:lnStyleLst>
+        <a:ln w="6350" cap="flat" cmpd="sng" algn="ctr">
+          <a:solidFill>
+            <a:schemeClr val="phClr"/>
+          </a:solidFill>
+          <a:prstDash val="solid"/>
+          <a:miter lim="800000"/>
+        </a:ln>
+        <a:ln w="12700" cap="flat" cmpd="sng" algn="ctr">
+          <a:solidFill>
+            <a:schemeClr val="phClr"/>
+          </a:solidFill>
+          <a:prstDash val="solid"/>
+          <a:miter lim="800000"/>
+        </a:ln>
+        <a:ln w="19050" cap="flat" cmpd="sng" algn="ctr">
+          <a:solidFill>
+            <a:schemeClr val="phClr"/>
+          </a:solidFill>
+          <a:prstDash val="solid"/>
+          <a:miter lim="800000"/>
+        </a:ln>
+      </a:lnStyleLst>
+      <a:effectStyleLst>
+        <a:effectStyle>
+          <a:effectLst/>
+        </a:effectStyle>
+        <a:effectStyle>
+          <a:effectLst/>
+        </a:effectStyle>
+        <a:effectStyle>
+          <a:effectLst>
+            <a:outerShdw blurRad="57150" dist="19050" dir="5400000" algn="ctr" rotWithShape="0">
+              <a:srgbClr val="000000">
+                <a:alpha val="63000"/>
+              </a:srgbClr>
+            </a:outerShdw>
+          </a:effectLst>
+        </a:effectStyle>
+      </a:effectStyleLst>
+      <a:bgFillStyleLst>
+        <a:solidFill>
+          <a:schemeClr val="phClr"/>
+        </a:solidFill>
+        <a:solidFill>
+          <a:schemeClr val="phClr">
+            <a:tint val="95000"/>
+            <a:satMod val="170000"/>
+          </a:schemeClr>
+        </a:solidFill>
+        <a:gradFill rotWithShape="1">
+          <a:gsLst>
+            <a:gs pos="0">
+              <a:schemeClr val="phClr">
+                <a:tint val="93000"/>
+                <a:satMod val="150000"/>
+                <a:shade val="98000"/>
+                <a:lumMod val="102000"/>
+              </a:schemeClr>
+            </a:gs>
+            <a:gs pos="50000">
+              <a:schemeClr val="phClr">
+                <a:tint val="98000"/>
+                <a:satMod val="130000"/>
+                <a:shade val="90000"/>
+                <a:lumMod val="103000"/>
+              </a:schemeClr>
+            </a:gs>
+            <a:gs pos="100000">
+              <a:schemeClr val="phClr">
+                <a:shade val="63000"/>
+                <a:satMod val="120000"/>
+              </a:schemeClr>
+            </a:gs>
+          </a:gsLst>
+          <a:lin ang="5400000" scaled="0"/>
+        </a:gradFill>
+      </a:bgFillStyleLst>
+    </a:fmtScheme>
+  </a:themeElements>
+  <a:objectDefaults/>
+  <a:extraClrSchemeLst/>
+  <a:extLst>
+    <a:ext uri="{05A4C25C-085E-4340-85A3-A5531E510DB2}">
+      <thm15:themeFamily xmlns:thm15="http://schemas.microsoft.com/office/thememl/2012/main" name="Office Theme" id="{62F939B6-93AF-4DB8-9C6B-D6C7DFDC589F}" vid="{4A3C46E8-61CC-4603-A589-7422A47A8E4A}"/>
+    </a:ext>
+  </a:extLst>
+</a:theme>
+</file>
+
+<file path=ppt/theme/theme2.xml><?xml version="1.0" encoding="utf-8"?>
 <a:theme xmlns:a="http://schemas.openxmlformats.org/drawingml/2006/main" name="Office Theme">
   <a:themeElements>
     <a:clrScheme name="Office">

</xml_diff>